<commit_message>
Visual Production Manual Updated
</commit_message>
<xml_diff>
--- a/documentation/Visual Product Manual/Visual Production Manual.pptx
+++ b/documentation/Visual Product Manual/Visual Production Manual.pptx
@@ -10,6 +10,7 @@
     <p:sldId id="257" r:id="rId4"/>
     <p:sldId id="259" r:id="rId5"/>
     <p:sldId id="260" r:id="rId6"/>
+    <p:sldId id="261" r:id="rId7"/>
   </p:sldIdLst>
   <p:sldSz cx="12192000" cy="6858000"/>
   <p:notesSz cx="6858000" cy="9144000"/>
@@ -108,6 +109,11 @@
       </a:defRPr>
     </a:lvl9pPr>
   </p:defaultTextStyle>
+  <p:extLst>
+    <p:ext uri="{EFAFB233-063F-42B5-8137-9DF3F51BA10A}">
+      <p15:sldGuideLst xmlns:p15="http://schemas.microsoft.com/office/powerpoint/2012/main"/>
+    </p:ext>
+  </p:extLst>
 </p:presentation>
 </file>
 
@@ -3700,52 +3706,6 @@
       </p:sp>
       <p:sp>
         <p:nvSpPr>
-          <p:cNvPr id="17" name="Arrow: Up 16">
-            <a:extLst>
-              <a:ext uri="{FF2B5EF4-FFF2-40B4-BE49-F238E27FC236}">
-                <a16:creationId xmlns:a16="http://schemas.microsoft.com/office/drawing/2014/main" id="{6A35CCB5-9DE1-4D2F-ACF5-1608B075F63A}"/>
-              </a:ext>
-            </a:extLst>
-          </p:cNvPr>
-          <p:cNvSpPr/>
-          <p:nvPr/>
-        </p:nvSpPr>
-        <p:spPr>
-          <a:xfrm rot="5400000">
-            <a:off x="3410470" y="2916202"/>
-            <a:ext cx="263611" cy="477795"/>
-          </a:xfrm>
-          <a:prstGeom prst="upArrow">
-            <a:avLst/>
-          </a:prstGeom>
-        </p:spPr>
-        <p:style>
-          <a:lnRef idx="2">
-            <a:schemeClr val="accent1">
-              <a:shade val="50000"/>
-            </a:schemeClr>
-          </a:lnRef>
-          <a:fillRef idx="1">
-            <a:schemeClr val="accent1"/>
-          </a:fillRef>
-          <a:effectRef idx="0">
-            <a:schemeClr val="accent1"/>
-          </a:effectRef>
-          <a:fontRef idx="minor">
-            <a:schemeClr val="lt1"/>
-          </a:fontRef>
-        </p:style>
-        <p:txBody>
-          <a:bodyPr rtlCol="0" anchor="ctr"/>
-          <a:lstStyle/>
-          <a:p>
-            <a:pPr algn="ctr"/>
-            <a:endParaRPr lang="en-CH"/>
-          </a:p>
-        </p:txBody>
-      </p:sp>
-      <p:sp>
-        <p:nvSpPr>
           <p:cNvPr id="18" name="Arrow: Up 17">
             <a:extLst>
               <a:ext uri="{FF2B5EF4-FFF2-40B4-BE49-F238E27FC236}">
@@ -3851,7 +3811,7 @@
         <p:spPr>
           <a:xfrm>
             <a:off x="1899856" y="1301578"/>
-            <a:ext cx="1584755" cy="646331"/>
+            <a:ext cx="1584755" cy="1077218"/>
           </a:xfrm>
           <a:prstGeom prst="rect">
             <a:avLst/>
@@ -3865,34 +3825,34 @@
           <a:lstStyle/>
           <a:p>
             <a:r>
-              <a:rPr lang="de-CH" sz="1200" dirty="0"/>
+              <a:rPr lang="de-CH" sz="1600" dirty="0"/>
               <a:t>Redirect </a:t>
             </a:r>
             <a:r>
-              <a:rPr lang="de-CH" sz="1200" dirty="0" err="1"/>
+              <a:rPr lang="de-CH" sz="1600" dirty="0" err="1"/>
               <a:t>to</a:t>
             </a:r>
             <a:r>
-              <a:rPr lang="de-CH" sz="1200" dirty="0"/>
+              <a:rPr lang="de-CH" sz="1600" dirty="0"/>
               <a:t> ‘Home’, Job </a:t>
             </a:r>
             <a:r>
-              <a:rPr lang="de-CH" sz="1200" dirty="0" err="1"/>
+              <a:rPr lang="de-CH" sz="1600" dirty="0" err="1"/>
               <a:t>Offers</a:t>
             </a:r>
             <a:r>
-              <a:rPr lang="de-CH" sz="1200" dirty="0"/>
+              <a:rPr lang="de-CH" sz="1600" dirty="0"/>
               <a:t> </a:t>
             </a:r>
             <a:r>
-              <a:rPr lang="de-CH" sz="1200" dirty="0" err="1"/>
+              <a:rPr lang="de-CH" sz="1600" dirty="0" err="1"/>
               <a:t>or</a:t>
             </a:r>
             <a:r>
-              <a:rPr lang="de-CH" sz="1200" dirty="0"/>
+              <a:rPr lang="de-CH" sz="1600" dirty="0"/>
               <a:t> Find a Job (Search)</a:t>
             </a:r>
-            <a:endParaRPr lang="en-CH" sz="1200" dirty="0"/>
+            <a:endParaRPr lang="en-CH" sz="1600" dirty="0"/>
           </a:p>
         </p:txBody>
       </p:sp>
@@ -3910,8 +3870,8 @@
         </p:nvSpPr>
         <p:spPr>
           <a:xfrm>
-            <a:off x="2603156" y="2440794"/>
-            <a:ext cx="683751" cy="1200329"/>
+            <a:off x="2158314" y="2440794"/>
+            <a:ext cx="1128593" cy="1077218"/>
           </a:xfrm>
           <a:prstGeom prst="rect">
             <a:avLst/>
@@ -3925,66 +3885,66 @@
           <a:lstStyle/>
           <a:p>
             <a:r>
-              <a:rPr lang="de-CH" sz="1200" dirty="0" err="1"/>
+              <a:rPr lang="de-CH" sz="1600" dirty="0" err="1"/>
               <a:t>Clicking</a:t>
             </a:r>
             <a:r>
-              <a:rPr lang="de-CH" sz="1200" dirty="0"/>
+              <a:rPr lang="de-CH" sz="1600" dirty="0"/>
               <a:t> on a </a:t>
             </a:r>
             <a:r>
-              <a:rPr lang="de-CH" sz="1200" dirty="0" err="1"/>
+              <a:rPr lang="de-CH" sz="1600" dirty="0" err="1"/>
               <a:t>job</a:t>
             </a:r>
             <a:r>
-              <a:rPr lang="de-CH" sz="1200" dirty="0"/>
+              <a:rPr lang="de-CH" sz="1600" dirty="0"/>
               <a:t> </a:t>
             </a:r>
             <a:r>
-              <a:rPr lang="de-CH" sz="1200" dirty="0" err="1"/>
+              <a:rPr lang="de-CH" sz="1600" dirty="0" err="1"/>
               <a:t>leads</a:t>
             </a:r>
             <a:r>
-              <a:rPr lang="de-CH" sz="1200" dirty="0"/>
+              <a:rPr lang="de-CH" sz="1600" dirty="0"/>
               <a:t> </a:t>
             </a:r>
             <a:r>
-              <a:rPr lang="de-CH" sz="1200" dirty="0" err="1"/>
+              <a:rPr lang="de-CH" sz="1600" dirty="0" err="1"/>
               <a:t>to</a:t>
             </a:r>
             <a:r>
-              <a:rPr lang="de-CH" sz="1200" dirty="0"/>
+              <a:rPr lang="de-CH" sz="1600" dirty="0"/>
               <a:t> </a:t>
             </a:r>
             <a:r>
-              <a:rPr lang="de-CH" sz="1200" dirty="0" err="1"/>
+              <a:rPr lang="de-CH" sz="1600" dirty="0" err="1"/>
               <a:t>details</a:t>
             </a:r>
             <a:r>
-              <a:rPr lang="de-CH" sz="1200" dirty="0"/>
+              <a:rPr lang="de-CH" sz="1600" dirty="0"/>
               <a:t> </a:t>
             </a:r>
             <a:r>
-              <a:rPr lang="de-CH" sz="1200" dirty="0" err="1"/>
+              <a:rPr lang="de-CH" sz="1600" dirty="0" err="1"/>
               <a:t>for</a:t>
             </a:r>
             <a:r>
-              <a:rPr lang="de-CH" sz="1200" dirty="0"/>
+              <a:rPr lang="de-CH" sz="1600" dirty="0"/>
               <a:t> </a:t>
             </a:r>
             <a:r>
-              <a:rPr lang="de-CH" sz="1200" dirty="0" err="1"/>
+              <a:rPr lang="de-CH" sz="1600" dirty="0" err="1"/>
               <a:t>that</a:t>
             </a:r>
             <a:r>
-              <a:rPr lang="de-CH" sz="1200" dirty="0"/>
+              <a:rPr lang="de-CH" sz="1600" dirty="0"/>
               <a:t> </a:t>
             </a:r>
             <a:r>
-              <a:rPr lang="de-CH" sz="1200" dirty="0" err="1"/>
+              <a:rPr lang="de-CH" sz="1600" dirty="0" err="1"/>
               <a:t>job</a:t>
             </a:r>
-            <a:endParaRPr lang="en-CH" sz="1200" dirty="0"/>
+            <a:endParaRPr lang="en-CH" sz="1600" dirty="0"/>
           </a:p>
         </p:txBody>
       </p:sp>
@@ -4003,7 +3963,7 @@
         <p:spPr>
           <a:xfrm>
             <a:off x="8530277" y="4353698"/>
-            <a:ext cx="2384831" cy="276999"/>
+            <a:ext cx="2384831" cy="338554"/>
           </a:xfrm>
           <a:prstGeom prst="rect">
             <a:avLst/>
@@ -4017,34 +3977,26 @@
           <a:lstStyle/>
           <a:p>
             <a:r>
-              <a:rPr lang="de-CH" sz="1200" dirty="0"/>
+              <a:rPr lang="de-CH" sz="1600" dirty="0"/>
               <a:t>Redirect </a:t>
             </a:r>
             <a:r>
-              <a:rPr lang="de-CH" sz="1200" dirty="0" err="1"/>
+              <a:rPr lang="de-CH" sz="1600" dirty="0" err="1"/>
               <a:t>to</a:t>
             </a:r>
             <a:r>
-              <a:rPr lang="de-CH" sz="1200" dirty="0"/>
-              <a:t> </a:t>
-            </a:r>
-            <a:r>
-              <a:rPr lang="de-CH" sz="1200" dirty="0" err="1"/>
-              <a:t>small</a:t>
-            </a:r>
-            <a:r>
-              <a:rPr lang="de-CH" sz="1200" dirty="0"/>
+              <a:rPr lang="de-CH" sz="1600" dirty="0"/>
               <a:t> About </a:t>
             </a:r>
             <a:r>
-              <a:rPr lang="de-CH" sz="1200" dirty="0" err="1"/>
+              <a:rPr lang="de-CH" sz="1600" dirty="0" err="1"/>
               <a:t>Us</a:t>
             </a:r>
             <a:r>
-              <a:rPr lang="de-CH" sz="1200" dirty="0"/>
+              <a:rPr lang="de-CH" sz="1600" dirty="0"/>
               <a:t> Page</a:t>
             </a:r>
-            <a:endParaRPr lang="en-CH" sz="1200" dirty="0"/>
+            <a:endParaRPr lang="en-CH" sz="1600" dirty="0"/>
           </a:p>
         </p:txBody>
       </p:sp>
@@ -4062,8 +4014,8 @@
         </p:nvSpPr>
         <p:spPr>
           <a:xfrm>
-            <a:off x="10603102" y="1313932"/>
-            <a:ext cx="1584755" cy="1015663"/>
+            <a:off x="9918358" y="1313932"/>
+            <a:ext cx="2269500" cy="1077218"/>
           </a:xfrm>
           <a:prstGeom prst="rect">
             <a:avLst/>
@@ -4077,86 +4029,86 @@
           <a:lstStyle/>
           <a:p>
             <a:r>
-              <a:rPr lang="de-CH" sz="1200" dirty="0"/>
+              <a:rPr lang="de-CH" sz="1600" dirty="0"/>
               <a:t>Login / Register </a:t>
             </a:r>
             <a:r>
-              <a:rPr lang="de-CH" sz="1200" dirty="0" err="1"/>
+              <a:rPr lang="de-CH" sz="1600" dirty="0" err="1"/>
               <a:t>lead</a:t>
             </a:r>
             <a:r>
-              <a:rPr lang="de-CH" sz="1200" dirty="0"/>
+              <a:rPr lang="de-CH" sz="1600" dirty="0"/>
               <a:t> </a:t>
             </a:r>
             <a:r>
-              <a:rPr lang="de-CH" sz="1200" dirty="0" err="1"/>
+              <a:rPr lang="de-CH" sz="1600" dirty="0" err="1"/>
               <a:t>to</a:t>
             </a:r>
             <a:r>
-              <a:rPr lang="de-CH" sz="1200" dirty="0"/>
+              <a:rPr lang="de-CH" sz="1600" dirty="0"/>
               <a:t> </a:t>
             </a:r>
             <a:r>
-              <a:rPr lang="de-CH" sz="1200" dirty="0" err="1"/>
+              <a:rPr lang="de-CH" sz="1600" dirty="0" err="1"/>
               <a:t>respective</a:t>
             </a:r>
             <a:r>
-              <a:rPr lang="de-CH" sz="1200" dirty="0"/>
+              <a:rPr lang="de-CH" sz="1600" dirty="0"/>
               <a:t> </a:t>
             </a:r>
             <a:r>
-              <a:rPr lang="de-CH" sz="1200" dirty="0" err="1"/>
+              <a:rPr lang="de-CH" sz="1600" dirty="0" err="1"/>
               <a:t>components</a:t>
             </a:r>
             <a:r>
-              <a:rPr lang="de-CH" sz="1200" dirty="0"/>
-              <a:t>, </a:t>
-            </a:r>
-            <a:r>
-              <a:rPr lang="de-CH" sz="1200" dirty="0" err="1"/>
-              <a:t>lightbulb</a:t>
-            </a:r>
-            <a:r>
-              <a:rPr lang="de-CH" sz="1200" dirty="0"/>
+              <a:rPr lang="de-CH" sz="1600" dirty="0"/>
+              <a:t>. </a:t>
+            </a:r>
+            <a:r>
+              <a:rPr lang="de-CH" sz="1600" dirty="0" err="1"/>
+              <a:t>Lightbulb</a:t>
+            </a:r>
+            <a:r>
+              <a:rPr lang="de-CH" sz="1600" dirty="0"/>
               <a:t> (on </a:t>
             </a:r>
             <a:r>
-              <a:rPr lang="de-CH" sz="1200" dirty="0" err="1"/>
+              <a:rPr lang="de-CH" sz="1600" dirty="0" err="1"/>
               <a:t>click</a:t>
             </a:r>
             <a:r>
-              <a:rPr lang="de-CH" sz="1200" dirty="0"/>
+              <a:rPr lang="de-CH" sz="1600" dirty="0"/>
               <a:t>) </a:t>
             </a:r>
             <a:r>
-              <a:rPr lang="de-CH" sz="1200" dirty="0" err="1"/>
+              <a:rPr lang="de-CH" sz="1600" dirty="0" err="1"/>
               <a:t>changes</a:t>
             </a:r>
             <a:r>
-              <a:rPr lang="de-CH" sz="1200" dirty="0"/>
+              <a:rPr lang="de-CH" sz="1600" dirty="0"/>
               <a:t> </a:t>
             </a:r>
             <a:r>
-              <a:rPr lang="de-CH" sz="1200" dirty="0" err="1"/>
+              <a:rPr lang="de-CH" sz="1600" dirty="0" err="1"/>
               <a:t>to</a:t>
             </a:r>
             <a:r>
-              <a:rPr lang="de-CH" sz="1200" dirty="0"/>
+              <a:rPr lang="de-CH" sz="1600" dirty="0"/>
               <a:t> </a:t>
             </a:r>
             <a:r>
-              <a:rPr lang="de-CH" sz="1200" dirty="0" err="1"/>
+              <a:rPr lang="de-CH" sz="1600" dirty="0" err="1"/>
               <a:t>night</a:t>
             </a:r>
             <a:r>
-              <a:rPr lang="de-CH" sz="1200" dirty="0"/>
+              <a:rPr lang="de-CH" sz="1600" dirty="0"/>
               <a:t> </a:t>
             </a:r>
             <a:r>
-              <a:rPr lang="de-CH" sz="1200" dirty="0" err="1"/>
+              <a:rPr lang="de-CH" sz="1600" dirty="0" err="1"/>
               <a:t>theme</a:t>
             </a:r>
-            <a:endParaRPr lang="en-CH" sz="1200" dirty="0"/>
+            <a:endParaRPr lang="en-CH" sz="1600" dirty="0"/>
           </a:p>
         </p:txBody>
       </p:sp>
@@ -4175,7 +4127,7 @@
         <p:spPr>
           <a:xfrm>
             <a:off x="0" y="1313932"/>
-            <a:ext cx="1898855" cy="830997"/>
+            <a:ext cx="1898855" cy="1077218"/>
           </a:xfrm>
           <a:prstGeom prst="rect">
             <a:avLst/>
@@ -4189,38 +4141,38 @@
           <a:lstStyle/>
           <a:p>
             <a:r>
-              <a:rPr lang="de-CH" sz="1200" dirty="0"/>
+              <a:rPr lang="de-CH" sz="1600" dirty="0"/>
               <a:t>Redundant links / </a:t>
             </a:r>
             <a:r>
-              <a:rPr lang="de-CH" sz="1200" dirty="0" err="1"/>
+              <a:rPr lang="de-CH" sz="1600" dirty="0" err="1"/>
               <a:t>messages</a:t>
             </a:r>
             <a:r>
-              <a:rPr lang="de-CH" sz="1200" dirty="0"/>
+              <a:rPr lang="de-CH" sz="1600" dirty="0"/>
               <a:t> will not </a:t>
             </a:r>
             <a:r>
-              <a:rPr lang="de-CH" sz="1200" dirty="0" err="1"/>
+              <a:rPr lang="de-CH" sz="1600" dirty="0" err="1"/>
               <a:t>be</a:t>
             </a:r>
             <a:r>
-              <a:rPr lang="de-CH" sz="1200" dirty="0"/>
+              <a:rPr lang="de-CH" sz="1600" dirty="0"/>
               <a:t> </a:t>
             </a:r>
             <a:r>
-              <a:rPr lang="de-CH" sz="1200" dirty="0" err="1"/>
+              <a:rPr lang="de-CH" sz="1600" dirty="0" err="1"/>
               <a:t>displayed</a:t>
             </a:r>
             <a:r>
-              <a:rPr lang="de-CH" sz="1200" dirty="0"/>
+              <a:rPr lang="de-CH" sz="1600" dirty="0"/>
               <a:t> on subsequent </a:t>
             </a:r>
             <a:r>
-              <a:rPr lang="de-CH" sz="1200" dirty="0" err="1"/>
+              <a:rPr lang="de-CH" sz="1600" dirty="0" err="1"/>
               <a:t>pages</a:t>
             </a:r>
-            <a:endParaRPr lang="en-CH" sz="1200" dirty="0"/>
+            <a:endParaRPr lang="en-CH" sz="1600" dirty="0"/>
           </a:p>
         </p:txBody>
       </p:sp>
@@ -4392,98 +4344,6 @@
       </p:sp>
       <p:sp>
         <p:nvSpPr>
-          <p:cNvPr id="17" name="Arrow: Up 16">
-            <a:extLst>
-              <a:ext uri="{FF2B5EF4-FFF2-40B4-BE49-F238E27FC236}">
-                <a16:creationId xmlns:a16="http://schemas.microsoft.com/office/drawing/2014/main" id="{6A35CCB5-9DE1-4D2F-ACF5-1608B075F63A}"/>
-              </a:ext>
-            </a:extLst>
-          </p:cNvPr>
-          <p:cNvSpPr/>
-          <p:nvPr/>
-        </p:nvSpPr>
-        <p:spPr>
-          <a:xfrm rot="5400000">
-            <a:off x="3410470" y="2784419"/>
-            <a:ext cx="263611" cy="477795"/>
-          </a:xfrm>
-          <a:prstGeom prst="upArrow">
-            <a:avLst/>
-          </a:prstGeom>
-        </p:spPr>
-        <p:style>
-          <a:lnRef idx="2">
-            <a:schemeClr val="accent1">
-              <a:shade val="50000"/>
-            </a:schemeClr>
-          </a:lnRef>
-          <a:fillRef idx="1">
-            <a:schemeClr val="accent1"/>
-          </a:fillRef>
-          <a:effectRef idx="0">
-            <a:schemeClr val="accent1"/>
-          </a:effectRef>
-          <a:fontRef idx="minor">
-            <a:schemeClr val="lt1"/>
-          </a:fontRef>
-        </p:style>
-        <p:txBody>
-          <a:bodyPr rtlCol="0" anchor="ctr"/>
-          <a:lstStyle/>
-          <a:p>
-            <a:pPr algn="ctr"/>
-            <a:endParaRPr lang="en-CH"/>
-          </a:p>
-        </p:txBody>
-      </p:sp>
-      <p:sp>
-        <p:nvSpPr>
-          <p:cNvPr id="18" name="Arrow: Up 17">
-            <a:extLst>
-              <a:ext uri="{FF2B5EF4-FFF2-40B4-BE49-F238E27FC236}">
-                <a16:creationId xmlns:a16="http://schemas.microsoft.com/office/drawing/2014/main" id="{A1C9E8CC-BF69-4401-A7E5-D347723AB373}"/>
-              </a:ext>
-            </a:extLst>
-          </p:cNvPr>
-          <p:cNvSpPr/>
-          <p:nvPr/>
-        </p:nvSpPr>
-        <p:spPr>
-          <a:xfrm rot="5400000">
-            <a:off x="3393997" y="3321908"/>
-            <a:ext cx="263611" cy="477795"/>
-          </a:xfrm>
-          <a:prstGeom prst="upArrow">
-            <a:avLst/>
-          </a:prstGeom>
-        </p:spPr>
-        <p:style>
-          <a:lnRef idx="2">
-            <a:schemeClr val="accent1">
-              <a:shade val="50000"/>
-            </a:schemeClr>
-          </a:lnRef>
-          <a:fillRef idx="1">
-            <a:schemeClr val="accent1"/>
-          </a:fillRef>
-          <a:effectRef idx="0">
-            <a:schemeClr val="accent1"/>
-          </a:effectRef>
-          <a:fontRef idx="minor">
-            <a:schemeClr val="lt1"/>
-          </a:fontRef>
-        </p:style>
-        <p:txBody>
-          <a:bodyPr rtlCol="0" anchor="ctr"/>
-          <a:lstStyle/>
-          <a:p>
-            <a:pPr algn="ctr"/>
-            <a:endParaRPr lang="en-CH"/>
-          </a:p>
-        </p:txBody>
-      </p:sp>
-      <p:sp>
-        <p:nvSpPr>
           <p:cNvPr id="21" name="TextBox 20">
             <a:extLst>
               <a:ext uri="{FF2B5EF4-FFF2-40B4-BE49-F238E27FC236}">
@@ -4496,8 +4356,8 @@
         </p:nvSpPr>
         <p:spPr>
           <a:xfrm>
-            <a:off x="2627870" y="1688757"/>
-            <a:ext cx="659037" cy="3231654"/>
+            <a:off x="1899856" y="1688757"/>
+            <a:ext cx="1387052" cy="1815882"/>
           </a:xfrm>
           <a:prstGeom prst="rect">
             <a:avLst/>
@@ -4511,134 +4371,126 @@
           <a:lstStyle/>
           <a:p>
             <a:r>
-              <a:rPr lang="de-CH" sz="1200" dirty="0" err="1"/>
+              <a:rPr lang="de-CH" sz="1600" dirty="0" err="1"/>
               <a:t>Clicking</a:t>
             </a:r>
             <a:r>
-              <a:rPr lang="de-CH" sz="1200" dirty="0"/>
+              <a:rPr lang="de-CH" sz="1600" dirty="0"/>
               <a:t> on a </a:t>
             </a:r>
             <a:r>
-              <a:rPr lang="de-CH" sz="1200" dirty="0" err="1"/>
+              <a:rPr lang="de-CH" sz="1600" dirty="0" err="1"/>
               <a:t>job</a:t>
             </a:r>
             <a:r>
-              <a:rPr lang="de-CH" sz="1200" dirty="0"/>
+              <a:rPr lang="de-CH" sz="1600" dirty="0"/>
               <a:t> </a:t>
             </a:r>
             <a:r>
-              <a:rPr lang="de-CH" sz="1200" dirty="0" err="1"/>
+              <a:rPr lang="de-CH" sz="1600" dirty="0" err="1"/>
               <a:t>leads</a:t>
             </a:r>
             <a:r>
-              <a:rPr lang="de-CH" sz="1200" dirty="0"/>
+              <a:rPr lang="de-CH" sz="1600" dirty="0"/>
               <a:t> </a:t>
             </a:r>
             <a:r>
-              <a:rPr lang="de-CH" sz="1200" dirty="0" err="1"/>
+              <a:rPr lang="de-CH" sz="1600" dirty="0" err="1"/>
               <a:t>to</a:t>
             </a:r>
             <a:r>
-              <a:rPr lang="de-CH" sz="1200" dirty="0"/>
+              <a:rPr lang="de-CH" sz="1600" dirty="0"/>
               <a:t> </a:t>
             </a:r>
             <a:r>
-              <a:rPr lang="de-CH" sz="1200" dirty="0" err="1"/>
+              <a:rPr lang="de-CH" sz="1600" dirty="0" err="1"/>
               <a:t>details</a:t>
             </a:r>
             <a:r>
-              <a:rPr lang="de-CH" sz="1200" dirty="0"/>
+              <a:rPr lang="de-CH" sz="1600" dirty="0"/>
               <a:t> </a:t>
             </a:r>
             <a:r>
-              <a:rPr lang="de-CH" sz="1200" dirty="0" err="1"/>
+              <a:rPr lang="de-CH" sz="1600" dirty="0" err="1"/>
               <a:t>for</a:t>
             </a:r>
             <a:r>
-              <a:rPr lang="de-CH" sz="1200" dirty="0"/>
+              <a:rPr lang="de-CH" sz="1600" dirty="0"/>
               <a:t> </a:t>
             </a:r>
             <a:r>
-              <a:rPr lang="de-CH" sz="1200" dirty="0" err="1"/>
+              <a:rPr lang="de-CH" sz="1600" dirty="0" err="1"/>
               <a:t>that</a:t>
             </a:r>
             <a:r>
-              <a:rPr lang="de-CH" sz="1200" dirty="0"/>
+              <a:rPr lang="de-CH" sz="1600" dirty="0"/>
               <a:t> </a:t>
             </a:r>
             <a:r>
-              <a:rPr lang="de-CH" sz="1200" dirty="0" err="1"/>
+              <a:rPr lang="de-CH" sz="1600" dirty="0" err="1"/>
               <a:t>job</a:t>
             </a:r>
             <a:r>
-              <a:rPr lang="de-CH" sz="1200" dirty="0"/>
+              <a:rPr lang="de-CH" sz="1600" dirty="0"/>
               <a:t>, </a:t>
             </a:r>
             <a:r>
-              <a:rPr lang="de-CH" sz="1200" dirty="0" err="1"/>
+              <a:rPr lang="de-CH" sz="1600" dirty="0" err="1"/>
               <a:t>the</a:t>
             </a:r>
             <a:r>
-              <a:rPr lang="de-CH" sz="1200" dirty="0"/>
+              <a:rPr lang="de-CH" sz="1600" dirty="0"/>
               <a:t> </a:t>
             </a:r>
             <a:r>
-              <a:rPr lang="de-CH" sz="1200" dirty="0" err="1"/>
+              <a:rPr lang="de-CH" sz="1600" dirty="0" err="1"/>
               <a:t>job</a:t>
             </a:r>
             <a:r>
-              <a:rPr lang="de-CH" sz="1200" dirty="0"/>
+              <a:rPr lang="de-CH" sz="1600" dirty="0"/>
               <a:t> </a:t>
             </a:r>
             <a:r>
-              <a:rPr lang="de-CH" sz="1200" dirty="0" err="1"/>
+              <a:rPr lang="de-CH" sz="1600" dirty="0" err="1"/>
               <a:t>where</a:t>
             </a:r>
             <a:r>
-              <a:rPr lang="de-CH" sz="1200" dirty="0"/>
+              <a:rPr lang="de-CH" sz="1600" dirty="0"/>
               <a:t> </a:t>
             </a:r>
             <a:r>
-              <a:rPr lang="de-CH" sz="1200" dirty="0" err="1"/>
+              <a:rPr lang="de-CH" sz="1600" dirty="0" err="1"/>
               <a:t>the</a:t>
             </a:r>
             <a:r>
-              <a:rPr lang="de-CH" sz="1200" dirty="0"/>
+              <a:rPr lang="de-CH" sz="1600" dirty="0"/>
               <a:t> </a:t>
             </a:r>
             <a:r>
-              <a:rPr lang="de-CH" sz="1200" dirty="0" err="1"/>
+              <a:rPr lang="de-CH" sz="1600" dirty="0" err="1"/>
               <a:t>mouse</a:t>
             </a:r>
             <a:r>
-              <a:rPr lang="de-CH" sz="1200" dirty="0"/>
+              <a:rPr lang="de-CH" sz="1600" dirty="0"/>
               <a:t> </a:t>
             </a:r>
             <a:r>
-              <a:rPr lang="de-CH" sz="1200" dirty="0" err="1"/>
+              <a:rPr lang="de-CH" sz="1600" dirty="0" err="1"/>
               <a:t>hovers</a:t>
             </a:r>
             <a:r>
-              <a:rPr lang="de-CH" sz="1200" dirty="0"/>
+              <a:rPr lang="de-CH" sz="1600" dirty="0"/>
               <a:t> </a:t>
             </a:r>
             <a:r>
-              <a:rPr lang="de-CH" sz="1200" dirty="0" err="1"/>
-              <a:t>over</a:t>
-            </a:r>
-            <a:r>
-              <a:rPr lang="de-CH" sz="1200" dirty="0"/>
-              <a:t> </a:t>
-            </a:r>
-            <a:r>
-              <a:rPr lang="de-CH" sz="1200" dirty="0" err="1"/>
+              <a:rPr lang="de-CH" sz="1600" dirty="0" err="1"/>
               <a:t>has</a:t>
             </a:r>
             <a:r>
-              <a:rPr lang="de-CH" sz="1200" dirty="0"/>
+              <a:rPr lang="de-CH" sz="1600" dirty="0"/>
               <a:t> a highlight</a:t>
             </a:r>
-            <a:endParaRPr lang="en-CH" sz="1200" dirty="0"/>
+            <a:endParaRPr lang="en-CH" sz="1600" dirty="0"/>
           </a:p>
         </p:txBody>
       </p:sp>
@@ -4703,52 +4555,6 @@
         <p:spPr>
           <a:xfrm rot="5400000">
             <a:off x="3410470" y="4417555"/>
-            <a:ext cx="263611" cy="477795"/>
-          </a:xfrm>
-          <a:prstGeom prst="upArrow">
-            <a:avLst/>
-          </a:prstGeom>
-        </p:spPr>
-        <p:style>
-          <a:lnRef idx="2">
-            <a:schemeClr val="accent1">
-              <a:shade val="50000"/>
-            </a:schemeClr>
-          </a:lnRef>
-          <a:fillRef idx="1">
-            <a:schemeClr val="accent1"/>
-          </a:fillRef>
-          <a:effectRef idx="0">
-            <a:schemeClr val="accent1"/>
-          </a:effectRef>
-          <a:fontRef idx="minor">
-            <a:schemeClr val="lt1"/>
-          </a:fontRef>
-        </p:style>
-        <p:txBody>
-          <a:bodyPr rtlCol="0" anchor="ctr"/>
-          <a:lstStyle/>
-          <a:p>
-            <a:pPr algn="ctr"/>
-            <a:endParaRPr lang="en-CH"/>
-          </a:p>
-        </p:txBody>
-      </p:sp>
-      <p:sp>
-        <p:nvSpPr>
-          <p:cNvPr id="27" name="Arrow: Up 26">
-            <a:extLst>
-              <a:ext uri="{FF2B5EF4-FFF2-40B4-BE49-F238E27FC236}">
-                <a16:creationId xmlns:a16="http://schemas.microsoft.com/office/drawing/2014/main" id="{A67F1D1E-029F-4E9B-A73B-150A16617445}"/>
-              </a:ext>
-            </a:extLst>
-          </p:cNvPr>
-          <p:cNvSpPr/>
-          <p:nvPr/>
-        </p:nvSpPr>
-        <p:spPr>
-          <a:xfrm rot="5400000">
-            <a:off x="3393997" y="3865633"/>
             <a:ext cx="263611" cy="477795"/>
           </a:xfrm>
           <a:prstGeom prst="upArrow">
@@ -4948,7 +4754,7 @@
         <p:spPr>
           <a:xfrm>
             <a:off x="6701472" y="823784"/>
-            <a:ext cx="2409577" cy="646331"/>
+            <a:ext cx="2409577" cy="1077218"/>
           </a:xfrm>
           <a:prstGeom prst="rect">
             <a:avLst/>
@@ -4962,98 +4768,98 @@
           <a:lstStyle/>
           <a:p>
             <a:r>
-              <a:rPr lang="de-CH" sz="1200" dirty="0" err="1"/>
+              <a:rPr lang="de-CH" sz="1600" dirty="0" err="1"/>
               <a:t>Entering</a:t>
             </a:r>
             <a:r>
-              <a:rPr lang="de-CH" sz="1200" dirty="0"/>
+              <a:rPr lang="de-CH" sz="1600" dirty="0"/>
               <a:t> a </a:t>
             </a:r>
             <a:r>
-              <a:rPr lang="de-CH" sz="1200" dirty="0" err="1"/>
+              <a:rPr lang="de-CH" sz="1600" dirty="0" err="1"/>
               <a:t>search</a:t>
             </a:r>
             <a:r>
-              <a:rPr lang="de-CH" sz="1200" dirty="0"/>
+              <a:rPr lang="de-CH" sz="1600" dirty="0"/>
               <a:t> </a:t>
             </a:r>
             <a:r>
-              <a:rPr lang="de-CH" sz="1200" dirty="0" err="1"/>
+              <a:rPr lang="de-CH" sz="1600" dirty="0" err="1"/>
               <a:t>term</a:t>
             </a:r>
             <a:r>
-              <a:rPr lang="de-CH" sz="1200" dirty="0"/>
+              <a:rPr lang="de-CH" sz="1600" dirty="0"/>
               <a:t> and </a:t>
             </a:r>
             <a:r>
-              <a:rPr lang="de-CH" sz="1200" dirty="0" err="1"/>
+              <a:rPr lang="de-CH" sz="1600" dirty="0" err="1"/>
               <a:t>pressing</a:t>
             </a:r>
             <a:r>
-              <a:rPr lang="de-CH" sz="1200" dirty="0"/>
+              <a:rPr lang="de-CH" sz="1600" dirty="0"/>
               <a:t> ‘Enter’ </a:t>
             </a:r>
             <a:r>
-              <a:rPr lang="de-CH" sz="1200" dirty="0" err="1"/>
+              <a:rPr lang="de-CH" sz="1600" dirty="0" err="1"/>
               <a:t>or</a:t>
             </a:r>
             <a:r>
-              <a:rPr lang="de-CH" sz="1200" dirty="0"/>
+              <a:rPr lang="de-CH" sz="1600" dirty="0"/>
               <a:t> </a:t>
             </a:r>
             <a:r>
-              <a:rPr lang="de-CH" sz="1200" dirty="0" err="1"/>
+              <a:rPr lang="de-CH" sz="1600" dirty="0" err="1"/>
               <a:t>the</a:t>
             </a:r>
             <a:r>
-              <a:rPr lang="de-CH" sz="1200" dirty="0"/>
+              <a:rPr lang="de-CH" sz="1600" dirty="0"/>
               <a:t> Search </a:t>
             </a:r>
             <a:r>
-              <a:rPr lang="de-CH" sz="1200" dirty="0" err="1"/>
+              <a:rPr lang="de-CH" sz="1600" dirty="0" err="1"/>
               <a:t>button</a:t>
             </a:r>
             <a:r>
-              <a:rPr lang="de-CH" sz="1200" dirty="0"/>
+              <a:rPr lang="de-CH" sz="1600" dirty="0"/>
               <a:t> </a:t>
             </a:r>
             <a:r>
-              <a:rPr lang="de-CH" sz="1200" dirty="0" err="1"/>
+              <a:rPr lang="de-CH" sz="1600" dirty="0" err="1"/>
               <a:t>searches</a:t>
             </a:r>
             <a:r>
-              <a:rPr lang="de-CH" sz="1200" dirty="0"/>
+              <a:rPr lang="de-CH" sz="1600" dirty="0"/>
               <a:t> </a:t>
             </a:r>
             <a:r>
-              <a:rPr lang="de-CH" sz="1200" dirty="0" err="1"/>
+              <a:rPr lang="de-CH" sz="1600" dirty="0" err="1"/>
               <a:t>job</a:t>
             </a:r>
             <a:r>
-              <a:rPr lang="de-CH" sz="1200" dirty="0"/>
+              <a:rPr lang="de-CH" sz="1600" dirty="0"/>
               <a:t> </a:t>
             </a:r>
             <a:r>
-              <a:rPr lang="de-CH" sz="1200" dirty="0" err="1"/>
+              <a:rPr lang="de-CH" sz="1600" dirty="0" err="1"/>
               <a:t>titles</a:t>
             </a:r>
             <a:r>
-              <a:rPr lang="de-CH" sz="1200" dirty="0"/>
+              <a:rPr lang="de-CH" sz="1600" dirty="0"/>
               <a:t> </a:t>
             </a:r>
             <a:r>
-              <a:rPr lang="de-CH" sz="1200" dirty="0" err="1"/>
+              <a:rPr lang="de-CH" sz="1600" dirty="0" err="1"/>
               <a:t>for</a:t>
             </a:r>
             <a:r>
-              <a:rPr lang="de-CH" sz="1200" dirty="0"/>
+              <a:rPr lang="de-CH" sz="1600" dirty="0"/>
               <a:t> </a:t>
             </a:r>
             <a:r>
-              <a:rPr lang="de-CH" sz="1200" dirty="0" err="1"/>
+              <a:rPr lang="de-CH" sz="1600" dirty="0" err="1"/>
               <a:t>matches</a:t>
             </a:r>
-            <a:endParaRPr lang="en-CH" sz="1200" dirty="0"/>
+            <a:endParaRPr lang="en-CH" sz="1600" dirty="0"/>
           </a:p>
         </p:txBody>
       </p:sp>
@@ -5302,7 +5108,7 @@
         <p:spPr>
           <a:xfrm>
             <a:off x="0" y="1313932"/>
-            <a:ext cx="1898855" cy="461665"/>
+            <a:ext cx="1898855" cy="584775"/>
           </a:xfrm>
           <a:prstGeom prst="rect">
             <a:avLst/>
@@ -5316,26 +5122,26 @@
           <a:lstStyle/>
           <a:p>
             <a:r>
-              <a:rPr lang="de-CH" sz="1200" dirty="0" err="1"/>
+              <a:rPr lang="de-CH" sz="1600" dirty="0" err="1"/>
               <a:t>No</a:t>
             </a:r>
             <a:r>
-              <a:rPr lang="de-CH" sz="1200" dirty="0"/>
+              <a:rPr lang="de-CH" sz="1600" dirty="0"/>
               <a:t> additional </a:t>
             </a:r>
             <a:r>
-              <a:rPr lang="de-CH" sz="1200" dirty="0" err="1"/>
+              <a:rPr lang="de-CH" sz="1600" dirty="0" err="1"/>
               <a:t>comments</a:t>
             </a:r>
             <a:r>
-              <a:rPr lang="de-CH" sz="1200" dirty="0"/>
+              <a:rPr lang="de-CH" sz="1600" dirty="0"/>
               <a:t> </a:t>
             </a:r>
             <a:r>
-              <a:rPr lang="de-CH" sz="1200" dirty="0" err="1"/>
+              <a:rPr lang="de-CH" sz="1600" dirty="0" err="1"/>
               <a:t>needed</a:t>
             </a:r>
-            <a:endParaRPr lang="en-CH" sz="1200" dirty="0"/>
+            <a:endParaRPr lang="en-CH" sz="1600" dirty="0"/>
           </a:p>
         </p:txBody>
       </p:sp>
@@ -5343,6 +5149,244 @@
     <p:extLst>
       <p:ext uri="{BB962C8B-B14F-4D97-AF65-F5344CB8AC3E}">
         <p14:creationId xmlns:p14="http://schemas.microsoft.com/office/powerpoint/2010/main" val="2390534838"/>
+      </p:ext>
+    </p:extLst>
+  </p:cSld>
+  <p:clrMapOvr>
+    <a:masterClrMapping/>
+  </p:clrMapOvr>
+</p:sld>
+</file>
+
+<file path=ppt/slides/slide6.xml><?xml version="1.0" encoding="utf-8"?>
+<p:sld xmlns:a="http://schemas.openxmlformats.org/drawingml/2006/main" xmlns:r="http://schemas.openxmlformats.org/officeDocument/2006/relationships" xmlns:p="http://schemas.openxmlformats.org/presentationml/2006/main">
+  <p:cSld>
+    <p:spTree>
+      <p:nvGrpSpPr>
+        <p:cNvPr id="1" name=""/>
+        <p:cNvGrpSpPr/>
+        <p:nvPr/>
+      </p:nvGrpSpPr>
+      <p:grpSpPr>
+        <a:xfrm>
+          <a:off x="0" y="0"/>
+          <a:ext cx="0" cy="0"/>
+          <a:chOff x="0" y="0"/>
+          <a:chExt cx="0" cy="0"/>
+        </a:xfrm>
+      </p:grpSpPr>
+      <p:sp>
+        <p:nvSpPr>
+          <p:cNvPr id="7" name="TextBox 6">
+            <a:extLst>
+              <a:ext uri="{FF2B5EF4-FFF2-40B4-BE49-F238E27FC236}">
+                <a16:creationId xmlns:a16="http://schemas.microsoft.com/office/drawing/2014/main" id="{F891451A-7303-4AE5-8616-9A4A9CACE2C7}"/>
+              </a:ext>
+            </a:extLst>
+          </p:cNvPr>
+          <p:cNvSpPr txBox="1"/>
+          <p:nvPr/>
+        </p:nvSpPr>
+        <p:spPr>
+          <a:xfrm>
+            <a:off x="0" y="1313932"/>
+            <a:ext cx="1898855" cy="830997"/>
+          </a:xfrm>
+          <a:prstGeom prst="rect">
+            <a:avLst/>
+          </a:prstGeom>
+          <a:noFill/>
+        </p:spPr>
+        <p:txBody>
+          <a:bodyPr wrap="square" rtlCol="0">
+            <a:spAutoFit/>
+          </a:bodyPr>
+          <a:lstStyle/>
+          <a:p>
+            <a:r>
+              <a:rPr lang="de-CH" sz="1600" dirty="0" err="1"/>
+              <a:t>Entering</a:t>
+            </a:r>
+            <a:r>
+              <a:rPr lang="de-CH" sz="1600" dirty="0"/>
+              <a:t> / </a:t>
+            </a:r>
+            <a:r>
+              <a:rPr lang="de-CH" sz="1600" dirty="0" err="1"/>
+              <a:t>clicking</a:t>
+            </a:r>
+            <a:r>
+              <a:rPr lang="de-CH" sz="1600" dirty="0"/>
+              <a:t> </a:t>
+            </a:r>
+            <a:r>
+              <a:rPr lang="de-CH" sz="1600" dirty="0" err="1"/>
+              <a:t>any</a:t>
+            </a:r>
+            <a:r>
+              <a:rPr lang="de-CH" sz="1600" dirty="0"/>
+              <a:t> invalid URL </a:t>
+            </a:r>
+            <a:r>
+              <a:rPr lang="de-CH" sz="1600" dirty="0" err="1"/>
+              <a:t>redirects</a:t>
+            </a:r>
+            <a:r>
+              <a:rPr lang="de-CH" sz="1600" dirty="0"/>
+              <a:t> </a:t>
+            </a:r>
+            <a:r>
+              <a:rPr lang="de-CH" sz="1600" dirty="0" err="1"/>
+              <a:t>here</a:t>
+            </a:r>
+            <a:endParaRPr lang="en-CH" sz="1600" dirty="0"/>
+          </a:p>
+        </p:txBody>
+      </p:sp>
+      <p:pic>
+        <p:nvPicPr>
+          <p:cNvPr id="4" name="Picture 3">
+            <a:extLst>
+              <a:ext uri="{FF2B5EF4-FFF2-40B4-BE49-F238E27FC236}">
+                <a16:creationId xmlns:a16="http://schemas.microsoft.com/office/drawing/2014/main" id="{1601442A-C1C1-4F6D-BB12-DE9DDFB02BCA}"/>
+              </a:ext>
+            </a:extLst>
+          </p:cNvPr>
+          <p:cNvPicPr>
+            <a:picLocks noChangeAspect="1"/>
+          </p:cNvPicPr>
+          <p:nvPr/>
+        </p:nvPicPr>
+        <p:blipFill>
+          <a:blip r:embed="rId2"/>
+          <a:stretch>
+            <a:fillRect/>
+          </a:stretch>
+        </p:blipFill>
+        <p:spPr>
+          <a:xfrm>
+            <a:off x="1899855" y="0"/>
+            <a:ext cx="10287000" cy="6858000"/>
+          </a:xfrm>
+          <a:prstGeom prst="rect">
+            <a:avLst/>
+          </a:prstGeom>
+        </p:spPr>
+      </p:pic>
+      <p:sp>
+        <p:nvSpPr>
+          <p:cNvPr id="8" name="Arrow: Up 7">
+            <a:extLst>
+              <a:ext uri="{FF2B5EF4-FFF2-40B4-BE49-F238E27FC236}">
+                <a16:creationId xmlns:a16="http://schemas.microsoft.com/office/drawing/2014/main" id="{2EF3D950-6F69-4FF9-823E-BDB90FD85C73}"/>
+              </a:ext>
+            </a:extLst>
+          </p:cNvPr>
+          <p:cNvSpPr/>
+          <p:nvPr/>
+        </p:nvSpPr>
+        <p:spPr>
+          <a:xfrm rot="16200000">
+            <a:off x="4308388" y="3875897"/>
+            <a:ext cx="263611" cy="477795"/>
+          </a:xfrm>
+          <a:prstGeom prst="upArrow">
+            <a:avLst/>
+          </a:prstGeom>
+        </p:spPr>
+        <p:style>
+          <a:lnRef idx="2">
+            <a:schemeClr val="accent1">
+              <a:shade val="50000"/>
+            </a:schemeClr>
+          </a:lnRef>
+          <a:fillRef idx="1">
+            <a:schemeClr val="accent1"/>
+          </a:fillRef>
+          <a:effectRef idx="0">
+            <a:schemeClr val="accent1"/>
+          </a:effectRef>
+          <a:fontRef idx="minor">
+            <a:schemeClr val="lt1"/>
+          </a:fontRef>
+        </p:style>
+        <p:txBody>
+          <a:bodyPr rtlCol="0" anchor="ctr"/>
+          <a:lstStyle/>
+          <a:p>
+            <a:pPr algn="ctr"/>
+            <a:endParaRPr lang="en-CH"/>
+          </a:p>
+        </p:txBody>
+      </p:sp>
+      <p:sp>
+        <p:nvSpPr>
+          <p:cNvPr id="9" name="TextBox 8">
+            <a:extLst>
+              <a:ext uri="{FF2B5EF4-FFF2-40B4-BE49-F238E27FC236}">
+                <a16:creationId xmlns:a16="http://schemas.microsoft.com/office/drawing/2014/main" id="{001F6CED-9127-4637-89CB-8C03A244AF70}"/>
+              </a:ext>
+            </a:extLst>
+          </p:cNvPr>
+          <p:cNvSpPr txBox="1"/>
+          <p:nvPr/>
+        </p:nvSpPr>
+        <p:spPr>
+          <a:xfrm>
+            <a:off x="4716147" y="3929448"/>
+            <a:ext cx="3019183" cy="338554"/>
+          </a:xfrm>
+          <a:prstGeom prst="rect">
+            <a:avLst/>
+          </a:prstGeom>
+          <a:noFill/>
+        </p:spPr>
+        <p:txBody>
+          <a:bodyPr wrap="square" rtlCol="0">
+            <a:spAutoFit/>
+          </a:bodyPr>
+          <a:lstStyle/>
+          <a:p>
+            <a:r>
+              <a:rPr lang="de-CH" sz="1600" dirty="0"/>
+              <a:t>Redirects </a:t>
+            </a:r>
+            <a:r>
+              <a:rPr lang="de-CH" sz="1600" dirty="0" err="1"/>
+              <a:t>to</a:t>
+            </a:r>
+            <a:r>
+              <a:rPr lang="de-CH" sz="1600" dirty="0"/>
+              <a:t> </a:t>
+            </a:r>
+            <a:r>
+              <a:rPr lang="de-CH" sz="1600" dirty="0" err="1"/>
+              <a:t>the</a:t>
+            </a:r>
+            <a:r>
+              <a:rPr lang="de-CH" sz="1600" dirty="0"/>
+              <a:t> last </a:t>
+            </a:r>
+            <a:r>
+              <a:rPr lang="de-CH" sz="1600" dirty="0" err="1"/>
+              <a:t>visited</a:t>
+            </a:r>
+            <a:r>
+              <a:rPr lang="de-CH" sz="1600" dirty="0"/>
+              <a:t> </a:t>
+            </a:r>
+            <a:r>
+              <a:rPr lang="de-CH" sz="1600" dirty="0" err="1"/>
+              <a:t>page</a:t>
+            </a:r>
+            <a:endParaRPr lang="en-CH" sz="1600" dirty="0"/>
+          </a:p>
+        </p:txBody>
+      </p:sp>
+    </p:spTree>
+    <p:extLst>
+      <p:ext uri="{BB962C8B-B14F-4D97-AF65-F5344CB8AC3E}">
+        <p14:creationId xmlns:p14="http://schemas.microsoft.com/office/powerpoint/2010/main" val="2418882734"/>
       </p:ext>
     </p:extLst>
   </p:cSld>

</xml_diff>

<commit_message>
Bob/Tom have valid company, new DB Entries
</commit_message>
<xml_diff>
--- a/documentation/Visual Product Manual/Visual Production Manual.pptx
+++ b/documentation/Visual Product Manual/Visual Production Manual.pptx
@@ -11,6 +11,12 @@
     <p:sldId id="259" r:id="rId5"/>
     <p:sldId id="260" r:id="rId6"/>
     <p:sldId id="261" r:id="rId7"/>
+    <p:sldId id="262" r:id="rId8"/>
+    <p:sldId id="263" r:id="rId9"/>
+    <p:sldId id="264" r:id="rId10"/>
+    <p:sldId id="265" r:id="rId11"/>
+    <p:sldId id="267" r:id="rId12"/>
+    <p:sldId id="266" r:id="rId13"/>
   </p:sldIdLst>
   <p:sldSz cx="12192000" cy="6858000"/>
   <p:notesSz cx="6858000" cy="9144000"/>
@@ -4189,6 +4195,457 @@
 </p:sld>
 </file>
 
+<file path=ppt/slides/slide10.xml><?xml version="1.0" encoding="utf-8"?>
+<p:sld xmlns:a="http://schemas.openxmlformats.org/drawingml/2006/main" xmlns:r="http://schemas.openxmlformats.org/officeDocument/2006/relationships" xmlns:p="http://schemas.openxmlformats.org/presentationml/2006/main">
+  <p:cSld>
+    <p:spTree>
+      <p:nvGrpSpPr>
+        <p:cNvPr id="1" name=""/>
+        <p:cNvGrpSpPr/>
+        <p:nvPr/>
+      </p:nvGrpSpPr>
+      <p:grpSpPr>
+        <a:xfrm>
+          <a:off x="0" y="0"/>
+          <a:ext cx="0" cy="0"/>
+          <a:chOff x="0" y="0"/>
+          <a:chExt cx="0" cy="0"/>
+        </a:xfrm>
+      </p:grpSpPr>
+      <p:pic>
+        <p:nvPicPr>
+          <p:cNvPr id="2" name="Picture 1">
+            <a:extLst>
+              <a:ext uri="{FF2B5EF4-FFF2-40B4-BE49-F238E27FC236}">
+                <a16:creationId xmlns:a16="http://schemas.microsoft.com/office/drawing/2014/main" id="{67E2A728-02AF-4B87-B260-10B75530E411}"/>
+              </a:ext>
+            </a:extLst>
+          </p:cNvPr>
+          <p:cNvPicPr>
+            <a:picLocks noChangeAspect="1"/>
+          </p:cNvPicPr>
+          <p:nvPr/>
+        </p:nvPicPr>
+        <p:blipFill>
+          <a:blip r:embed="rId2"/>
+          <a:stretch>
+            <a:fillRect/>
+          </a:stretch>
+        </p:blipFill>
+        <p:spPr>
+          <a:xfrm>
+            <a:off x="1898855" y="0"/>
+            <a:ext cx="10287000" cy="6858000"/>
+          </a:xfrm>
+          <a:prstGeom prst="rect">
+            <a:avLst/>
+          </a:prstGeom>
+        </p:spPr>
+      </p:pic>
+      <p:sp>
+        <p:nvSpPr>
+          <p:cNvPr id="7" name="TextBox 6">
+            <a:extLst>
+              <a:ext uri="{FF2B5EF4-FFF2-40B4-BE49-F238E27FC236}">
+                <a16:creationId xmlns:a16="http://schemas.microsoft.com/office/drawing/2014/main" id="{D707282B-7F69-4459-BBDF-74F648A597E2}"/>
+              </a:ext>
+            </a:extLst>
+          </p:cNvPr>
+          <p:cNvSpPr txBox="1"/>
+          <p:nvPr/>
+        </p:nvSpPr>
+        <p:spPr>
+          <a:xfrm>
+            <a:off x="0" y="1313932"/>
+            <a:ext cx="1898855" cy="1077218"/>
+          </a:xfrm>
+          <a:prstGeom prst="rect">
+            <a:avLst/>
+          </a:prstGeom>
+          <a:noFill/>
+        </p:spPr>
+        <p:txBody>
+          <a:bodyPr wrap="square" rtlCol="0">
+            <a:spAutoFit/>
+          </a:bodyPr>
+          <a:lstStyle/>
+          <a:p>
+            <a:r>
+              <a:rPr lang="de-CH" sz="1600" dirty="0"/>
+              <a:t>The form </a:t>
+            </a:r>
+            <a:r>
+              <a:rPr lang="de-CH" sz="1600" dirty="0" err="1"/>
+              <a:t>should</a:t>
+            </a:r>
+            <a:r>
+              <a:rPr lang="de-CH" sz="1600" dirty="0"/>
+              <a:t> </a:t>
+            </a:r>
+            <a:r>
+              <a:rPr lang="de-CH" sz="1600" dirty="0" err="1"/>
+              <a:t>be</a:t>
+            </a:r>
+            <a:r>
+              <a:rPr lang="de-CH" sz="1600" dirty="0"/>
+              <a:t> </a:t>
+            </a:r>
+            <a:r>
+              <a:rPr lang="de-CH" sz="1600" dirty="0" err="1"/>
+              <a:t>self-explantory</a:t>
+            </a:r>
+            <a:r>
+              <a:rPr lang="de-CH" sz="1600" dirty="0"/>
+              <a:t>, </a:t>
+            </a:r>
+            <a:r>
+              <a:rPr lang="de-CH" sz="1600" dirty="0" err="1"/>
+              <a:t>error</a:t>
+            </a:r>
+            <a:r>
+              <a:rPr lang="de-CH" sz="1600" dirty="0"/>
+              <a:t> </a:t>
+            </a:r>
+            <a:r>
+              <a:rPr lang="de-CH" sz="1600" dirty="0" err="1"/>
+              <a:t>if</a:t>
+            </a:r>
+            <a:r>
+              <a:rPr lang="de-CH" sz="1600" dirty="0"/>
+              <a:t> </a:t>
+            </a:r>
+            <a:r>
+              <a:rPr lang="de-CH" sz="1600" dirty="0" err="1"/>
+              <a:t>information</a:t>
+            </a:r>
+            <a:r>
+              <a:rPr lang="de-CH" sz="1600" dirty="0"/>
+              <a:t> not </a:t>
+            </a:r>
+            <a:r>
+              <a:rPr lang="de-CH" sz="1600" dirty="0" err="1"/>
+              <a:t>filled</a:t>
+            </a:r>
+            <a:r>
+              <a:rPr lang="de-CH" sz="1600" dirty="0"/>
+              <a:t> in</a:t>
+            </a:r>
+            <a:endParaRPr lang="en-CH" sz="1600" dirty="0"/>
+          </a:p>
+        </p:txBody>
+      </p:sp>
+    </p:spTree>
+    <p:extLst>
+      <p:ext uri="{BB962C8B-B14F-4D97-AF65-F5344CB8AC3E}">
+        <p14:creationId xmlns:p14="http://schemas.microsoft.com/office/powerpoint/2010/main" val="3430094057"/>
+      </p:ext>
+    </p:extLst>
+  </p:cSld>
+  <p:clrMapOvr>
+    <a:masterClrMapping/>
+  </p:clrMapOvr>
+</p:sld>
+</file>
+
+<file path=ppt/slides/slide11.xml><?xml version="1.0" encoding="utf-8"?>
+<p:sld xmlns:a="http://schemas.openxmlformats.org/drawingml/2006/main" xmlns:r="http://schemas.openxmlformats.org/officeDocument/2006/relationships" xmlns:p="http://schemas.openxmlformats.org/presentationml/2006/main">
+  <p:cSld>
+    <p:spTree>
+      <p:nvGrpSpPr>
+        <p:cNvPr id="1" name=""/>
+        <p:cNvGrpSpPr/>
+        <p:nvPr/>
+      </p:nvGrpSpPr>
+      <p:grpSpPr>
+        <a:xfrm>
+          <a:off x="0" y="0"/>
+          <a:ext cx="0" cy="0"/>
+          <a:chOff x="0" y="0"/>
+          <a:chExt cx="0" cy="0"/>
+        </a:xfrm>
+      </p:grpSpPr>
+      <p:pic>
+        <p:nvPicPr>
+          <p:cNvPr id="3" name="Picture 2">
+            <a:extLst>
+              <a:ext uri="{FF2B5EF4-FFF2-40B4-BE49-F238E27FC236}">
+                <a16:creationId xmlns:a16="http://schemas.microsoft.com/office/drawing/2014/main" id="{830559CE-652B-4CC2-A2CB-A1CD48B25668}"/>
+              </a:ext>
+            </a:extLst>
+          </p:cNvPr>
+          <p:cNvPicPr>
+            <a:picLocks noChangeAspect="1"/>
+          </p:cNvPicPr>
+          <p:nvPr/>
+        </p:nvPicPr>
+        <p:blipFill>
+          <a:blip r:embed="rId2"/>
+          <a:stretch>
+            <a:fillRect/>
+          </a:stretch>
+        </p:blipFill>
+        <p:spPr>
+          <a:xfrm>
+            <a:off x="1898855" y="0"/>
+            <a:ext cx="10287000" cy="6858000"/>
+          </a:xfrm>
+          <a:prstGeom prst="rect">
+            <a:avLst/>
+          </a:prstGeom>
+        </p:spPr>
+      </p:pic>
+      <p:sp>
+        <p:nvSpPr>
+          <p:cNvPr id="5" name="TextBox 4">
+            <a:extLst>
+              <a:ext uri="{FF2B5EF4-FFF2-40B4-BE49-F238E27FC236}">
+                <a16:creationId xmlns:a16="http://schemas.microsoft.com/office/drawing/2014/main" id="{EC5C729F-F333-447B-9CB7-B341C342ECB8}"/>
+              </a:ext>
+            </a:extLst>
+          </p:cNvPr>
+          <p:cNvSpPr txBox="1"/>
+          <p:nvPr/>
+        </p:nvSpPr>
+        <p:spPr>
+          <a:xfrm>
+            <a:off x="0" y="1313932"/>
+            <a:ext cx="1898855" cy="1569660"/>
+          </a:xfrm>
+          <a:prstGeom prst="rect">
+            <a:avLst/>
+          </a:prstGeom>
+          <a:noFill/>
+        </p:spPr>
+        <p:txBody>
+          <a:bodyPr wrap="square" rtlCol="0">
+            <a:spAutoFit/>
+          </a:bodyPr>
+          <a:lstStyle/>
+          <a:p>
+            <a:r>
+              <a:rPr lang="de-CH" sz="1600" dirty="0" err="1"/>
+              <a:t>If</a:t>
+            </a:r>
+            <a:r>
+              <a:rPr lang="de-CH" sz="1600" dirty="0"/>
+              <a:t> </a:t>
+            </a:r>
+            <a:r>
+              <a:rPr lang="de-CH" sz="1600" dirty="0" err="1"/>
+              <a:t>logged</a:t>
+            </a:r>
+            <a:r>
+              <a:rPr lang="de-CH" sz="1600" dirty="0"/>
+              <a:t> in </a:t>
+            </a:r>
+            <a:r>
+              <a:rPr lang="de-CH" sz="1600" dirty="0" err="1"/>
+              <a:t>as</a:t>
+            </a:r>
+            <a:r>
+              <a:rPr lang="de-CH" sz="1600" dirty="0"/>
+              <a:t> </a:t>
+            </a:r>
+            <a:r>
+              <a:rPr lang="de-CH" sz="1600" dirty="0" err="1"/>
+              <a:t>admin</a:t>
+            </a:r>
+            <a:r>
+              <a:rPr lang="de-CH" sz="1600" dirty="0"/>
+              <a:t> </a:t>
+            </a:r>
+            <a:r>
+              <a:rPr lang="de-CH" sz="1600" dirty="0" err="1"/>
+              <a:t>you</a:t>
+            </a:r>
+            <a:r>
+              <a:rPr lang="de-CH" sz="1600" dirty="0"/>
+              <a:t> </a:t>
+            </a:r>
+            <a:r>
+              <a:rPr lang="de-CH" sz="1600" dirty="0" err="1"/>
+              <a:t>get</a:t>
+            </a:r>
+            <a:r>
+              <a:rPr lang="de-CH" sz="1600" dirty="0"/>
+              <a:t> an </a:t>
+            </a:r>
+            <a:r>
+              <a:rPr lang="de-CH" sz="1600" dirty="0" err="1"/>
+              <a:t>addition</a:t>
+            </a:r>
+            <a:r>
+              <a:rPr lang="de-CH" sz="1600" dirty="0"/>
+              <a:t> </a:t>
+            </a:r>
+            <a:r>
+              <a:rPr lang="de-CH" sz="1600" dirty="0" err="1"/>
+              <a:t>to</a:t>
+            </a:r>
+            <a:r>
+              <a:rPr lang="de-CH" sz="1600" dirty="0"/>
+              <a:t> </a:t>
+            </a:r>
+            <a:r>
+              <a:rPr lang="de-CH" sz="1600" dirty="0" err="1"/>
+              <a:t>the</a:t>
+            </a:r>
+            <a:r>
+              <a:rPr lang="de-CH" sz="1600" dirty="0"/>
+              <a:t> </a:t>
+            </a:r>
+            <a:r>
+              <a:rPr lang="de-CH" sz="1600" dirty="0" err="1"/>
+              <a:t>side</a:t>
+            </a:r>
+            <a:r>
+              <a:rPr lang="de-CH" sz="1600" dirty="0"/>
+              <a:t>-panel </a:t>
+            </a:r>
+          </a:p>
+          <a:p>
+            <a:endParaRPr lang="de-CH" sz="1600" dirty="0"/>
+          </a:p>
+          <a:p>
+            <a:r>
+              <a:rPr lang="de-CH" sz="1600" dirty="0"/>
+              <a:t>The </a:t>
+            </a:r>
+            <a:r>
+              <a:rPr lang="de-CH" sz="1600" dirty="0" err="1"/>
+              <a:t>bells</a:t>
+            </a:r>
+            <a:r>
+              <a:rPr lang="de-CH" sz="1600" dirty="0"/>
+              <a:t> </a:t>
+            </a:r>
+            <a:r>
+              <a:rPr lang="de-CH" sz="1600" dirty="0" err="1"/>
+              <a:t>notify</a:t>
+            </a:r>
+            <a:r>
+              <a:rPr lang="de-CH" sz="1600" dirty="0"/>
+              <a:t> </a:t>
+            </a:r>
+            <a:r>
+              <a:rPr lang="de-CH" sz="1600" dirty="0" err="1"/>
+              <a:t>you</a:t>
+            </a:r>
+            <a:r>
+              <a:rPr lang="de-CH" sz="1600" dirty="0"/>
+              <a:t> </a:t>
+            </a:r>
+            <a:r>
+              <a:rPr lang="de-CH" sz="1600" dirty="0" err="1"/>
+              <a:t>of</a:t>
+            </a:r>
+            <a:r>
+              <a:rPr lang="de-CH" sz="1600" dirty="0"/>
+              <a:t> open </a:t>
+            </a:r>
+            <a:r>
+              <a:rPr lang="de-CH" sz="1600" dirty="0" err="1"/>
+              <a:t>tasks</a:t>
+            </a:r>
+            <a:endParaRPr lang="de-CH" sz="1600" dirty="0"/>
+          </a:p>
+        </p:txBody>
+      </p:sp>
+    </p:spTree>
+    <p:extLst>
+      <p:ext uri="{BB962C8B-B14F-4D97-AF65-F5344CB8AC3E}">
+        <p14:creationId xmlns:p14="http://schemas.microsoft.com/office/powerpoint/2010/main" val="1251364092"/>
+      </p:ext>
+    </p:extLst>
+  </p:cSld>
+  <p:clrMapOvr>
+    <a:masterClrMapping/>
+  </p:clrMapOvr>
+</p:sld>
+</file>
+
+<file path=ppt/slides/slide12.xml><?xml version="1.0" encoding="utf-8"?>
+<p:sld xmlns:a="http://schemas.openxmlformats.org/drawingml/2006/main" xmlns:r="http://schemas.openxmlformats.org/officeDocument/2006/relationships" xmlns:p="http://schemas.openxmlformats.org/presentationml/2006/main">
+  <p:cSld>
+    <p:spTree>
+      <p:nvGrpSpPr>
+        <p:cNvPr id="1" name=""/>
+        <p:cNvGrpSpPr/>
+        <p:nvPr/>
+      </p:nvGrpSpPr>
+      <p:grpSpPr>
+        <a:xfrm>
+          <a:off x="0" y="0"/>
+          <a:ext cx="0" cy="0"/>
+          <a:chOff x="0" y="0"/>
+          <a:chExt cx="0" cy="0"/>
+        </a:xfrm>
+      </p:grpSpPr>
+      <p:sp>
+        <p:nvSpPr>
+          <p:cNvPr id="7" name="TextBox 6">
+            <a:extLst>
+              <a:ext uri="{FF2B5EF4-FFF2-40B4-BE49-F238E27FC236}">
+                <a16:creationId xmlns:a16="http://schemas.microsoft.com/office/drawing/2014/main" id="{D707282B-7F69-4459-BBDF-74F648A597E2}"/>
+              </a:ext>
+            </a:extLst>
+          </p:cNvPr>
+          <p:cNvSpPr txBox="1"/>
+          <p:nvPr/>
+        </p:nvSpPr>
+        <p:spPr>
+          <a:xfrm>
+            <a:off x="0" y="1313932"/>
+            <a:ext cx="1898855" cy="584775"/>
+          </a:xfrm>
+          <a:prstGeom prst="rect">
+            <a:avLst/>
+          </a:prstGeom>
+          <a:noFill/>
+        </p:spPr>
+        <p:txBody>
+          <a:bodyPr wrap="square" rtlCol="0">
+            <a:spAutoFit/>
+          </a:bodyPr>
+          <a:lstStyle/>
+          <a:p>
+            <a:r>
+              <a:rPr lang="de-CH" sz="1600" dirty="0"/>
+              <a:t>Shows </a:t>
+            </a:r>
+            <a:r>
+              <a:rPr lang="de-CH" sz="1600" dirty="0" err="1"/>
+              <a:t>the</a:t>
+            </a:r>
+            <a:r>
+              <a:rPr lang="de-CH" sz="1600" dirty="0"/>
+              <a:t> User and </a:t>
+            </a:r>
+            <a:r>
+              <a:rPr lang="de-CH" sz="1600" dirty="0" err="1"/>
+              <a:t>their</a:t>
+            </a:r>
+            <a:r>
+              <a:rPr lang="de-CH" sz="1600" dirty="0"/>
+              <a:t> Company</a:t>
+            </a:r>
+            <a:endParaRPr lang="en-CH" sz="1600" dirty="0"/>
+          </a:p>
+        </p:txBody>
+      </p:sp>
+    </p:spTree>
+    <p:extLst>
+      <p:ext uri="{BB962C8B-B14F-4D97-AF65-F5344CB8AC3E}">
+        <p14:creationId xmlns:p14="http://schemas.microsoft.com/office/powerpoint/2010/main" val="1593059838"/>
+      </p:ext>
+    </p:extLst>
+  </p:cSld>
+  <p:clrMapOvr>
+    <a:masterClrMapping/>
+  </p:clrMapOvr>
+</p:sld>
+</file>
+
 <file path=ppt/slides/slide2.xml><?xml version="1.0" encoding="utf-8"?>
 <p:sld xmlns:a="http://schemas.openxmlformats.org/drawingml/2006/main" xmlns:r="http://schemas.openxmlformats.org/officeDocument/2006/relationships" xmlns:p="http://schemas.openxmlformats.org/presentationml/2006/main">
   <p:cSld>
@@ -5387,6 +5844,934 @@
     <p:extLst>
       <p:ext uri="{BB962C8B-B14F-4D97-AF65-F5344CB8AC3E}">
         <p14:creationId xmlns:p14="http://schemas.microsoft.com/office/powerpoint/2010/main" val="2418882734"/>
+      </p:ext>
+    </p:extLst>
+  </p:cSld>
+  <p:clrMapOvr>
+    <a:masterClrMapping/>
+  </p:clrMapOvr>
+</p:sld>
+</file>
+
+<file path=ppt/slides/slide7.xml><?xml version="1.0" encoding="utf-8"?>
+<p:sld xmlns:a="http://schemas.openxmlformats.org/drawingml/2006/main" xmlns:r="http://schemas.openxmlformats.org/officeDocument/2006/relationships" xmlns:p="http://schemas.openxmlformats.org/presentationml/2006/main">
+  <p:cSld>
+    <p:spTree>
+      <p:nvGrpSpPr>
+        <p:cNvPr id="1" name=""/>
+        <p:cNvGrpSpPr/>
+        <p:nvPr/>
+      </p:nvGrpSpPr>
+      <p:grpSpPr>
+        <a:xfrm>
+          <a:off x="0" y="0"/>
+          <a:ext cx="0" cy="0"/>
+          <a:chOff x="0" y="0"/>
+          <a:chExt cx="0" cy="0"/>
+        </a:xfrm>
+      </p:grpSpPr>
+      <p:pic>
+        <p:nvPicPr>
+          <p:cNvPr id="2" name="Picture 1">
+            <a:extLst>
+              <a:ext uri="{FF2B5EF4-FFF2-40B4-BE49-F238E27FC236}">
+                <a16:creationId xmlns:a16="http://schemas.microsoft.com/office/drawing/2014/main" id="{05BBD25C-5622-456D-8933-F384FECBE0D7}"/>
+              </a:ext>
+            </a:extLst>
+          </p:cNvPr>
+          <p:cNvPicPr>
+            <a:picLocks noChangeAspect="1"/>
+          </p:cNvPicPr>
+          <p:nvPr/>
+        </p:nvPicPr>
+        <p:blipFill>
+          <a:blip r:embed="rId2"/>
+          <a:stretch>
+            <a:fillRect/>
+          </a:stretch>
+        </p:blipFill>
+        <p:spPr>
+          <a:xfrm>
+            <a:off x="1898855" y="-65903"/>
+            <a:ext cx="10287000" cy="6858000"/>
+          </a:xfrm>
+          <a:prstGeom prst="rect">
+            <a:avLst/>
+          </a:prstGeom>
+        </p:spPr>
+      </p:pic>
+      <p:sp>
+        <p:nvSpPr>
+          <p:cNvPr id="8" name="Arrow: Up 7">
+            <a:extLst>
+              <a:ext uri="{FF2B5EF4-FFF2-40B4-BE49-F238E27FC236}">
+                <a16:creationId xmlns:a16="http://schemas.microsoft.com/office/drawing/2014/main" id="{2EF3D950-6F69-4FF9-823E-BDB90FD85C73}"/>
+              </a:ext>
+            </a:extLst>
+          </p:cNvPr>
+          <p:cNvSpPr/>
+          <p:nvPr/>
+        </p:nvSpPr>
+        <p:spPr>
+          <a:xfrm rot="16200000">
+            <a:off x="4308388" y="4024181"/>
+            <a:ext cx="263611" cy="477795"/>
+          </a:xfrm>
+          <a:prstGeom prst="upArrow">
+            <a:avLst/>
+          </a:prstGeom>
+        </p:spPr>
+        <p:style>
+          <a:lnRef idx="2">
+            <a:schemeClr val="accent1">
+              <a:shade val="50000"/>
+            </a:schemeClr>
+          </a:lnRef>
+          <a:fillRef idx="1">
+            <a:schemeClr val="accent1"/>
+          </a:fillRef>
+          <a:effectRef idx="0">
+            <a:schemeClr val="accent1"/>
+          </a:effectRef>
+          <a:fontRef idx="minor">
+            <a:schemeClr val="lt1"/>
+          </a:fontRef>
+        </p:style>
+        <p:txBody>
+          <a:bodyPr rtlCol="0" anchor="ctr"/>
+          <a:lstStyle/>
+          <a:p>
+            <a:pPr algn="ctr"/>
+            <a:endParaRPr lang="en-CH"/>
+          </a:p>
+        </p:txBody>
+      </p:sp>
+      <p:sp>
+        <p:nvSpPr>
+          <p:cNvPr id="9" name="TextBox 8">
+            <a:extLst>
+              <a:ext uri="{FF2B5EF4-FFF2-40B4-BE49-F238E27FC236}">
+                <a16:creationId xmlns:a16="http://schemas.microsoft.com/office/drawing/2014/main" id="{001F6CED-9127-4637-89CB-8C03A244AF70}"/>
+              </a:ext>
+            </a:extLst>
+          </p:cNvPr>
+          <p:cNvSpPr txBox="1"/>
+          <p:nvPr/>
+        </p:nvSpPr>
+        <p:spPr>
+          <a:xfrm>
+            <a:off x="4716147" y="4077732"/>
+            <a:ext cx="3019183" cy="830997"/>
+          </a:xfrm>
+          <a:prstGeom prst="rect">
+            <a:avLst/>
+          </a:prstGeom>
+          <a:noFill/>
+        </p:spPr>
+        <p:txBody>
+          <a:bodyPr wrap="square" rtlCol="0">
+            <a:spAutoFit/>
+          </a:bodyPr>
+          <a:lstStyle/>
+          <a:p>
+            <a:r>
+              <a:rPr lang="de-CH" sz="1600" dirty="0" err="1"/>
+              <a:t>Submit</a:t>
+            </a:r>
+            <a:r>
+              <a:rPr lang="de-CH" sz="1600" dirty="0"/>
+              <a:t> </a:t>
+            </a:r>
+            <a:r>
+              <a:rPr lang="de-CH" sz="1600" dirty="0" err="1"/>
+              <a:t>the</a:t>
+            </a:r>
+            <a:r>
+              <a:rPr lang="de-CH" sz="1600" dirty="0"/>
+              <a:t> Form, Password must </a:t>
+            </a:r>
+            <a:r>
+              <a:rPr lang="de-CH" sz="1600" dirty="0" err="1"/>
+              <a:t>have</a:t>
+            </a:r>
+            <a:r>
+              <a:rPr lang="de-CH" sz="1600" dirty="0"/>
+              <a:t> a </a:t>
+            </a:r>
+            <a:r>
+              <a:rPr lang="de-CH" sz="1600" dirty="0" err="1"/>
+              <a:t>minimum</a:t>
+            </a:r>
+            <a:r>
+              <a:rPr lang="de-CH" sz="1600" dirty="0"/>
+              <a:t> </a:t>
+            </a:r>
+            <a:r>
+              <a:rPr lang="de-CH" sz="1600" dirty="0" err="1"/>
+              <a:t>length</a:t>
+            </a:r>
+            <a:r>
+              <a:rPr lang="de-CH" sz="1600" dirty="0"/>
+              <a:t> </a:t>
+            </a:r>
+            <a:r>
+              <a:rPr lang="de-CH" sz="1600" dirty="0" err="1"/>
+              <a:t>of</a:t>
+            </a:r>
+            <a:r>
+              <a:rPr lang="de-CH" sz="1600" dirty="0"/>
+              <a:t> 6 (</a:t>
+            </a:r>
+            <a:r>
+              <a:rPr lang="de-CH" sz="1600" dirty="0" err="1"/>
+              <a:t>error</a:t>
+            </a:r>
+            <a:r>
+              <a:rPr lang="de-CH" sz="1600" dirty="0"/>
+              <a:t> </a:t>
+            </a:r>
+            <a:r>
+              <a:rPr lang="de-CH" sz="1600" dirty="0" err="1"/>
+              <a:t>message</a:t>
+            </a:r>
+            <a:r>
+              <a:rPr lang="de-CH" sz="1600" dirty="0"/>
+              <a:t> </a:t>
+            </a:r>
+            <a:r>
+              <a:rPr lang="de-CH" sz="1600" dirty="0" err="1"/>
+              <a:t>otherwise</a:t>
+            </a:r>
+            <a:r>
+              <a:rPr lang="de-CH" sz="1600" dirty="0"/>
+              <a:t>)</a:t>
+            </a:r>
+            <a:endParaRPr lang="en-CH" sz="1600" dirty="0"/>
+          </a:p>
+        </p:txBody>
+      </p:sp>
+    </p:spTree>
+    <p:extLst>
+      <p:ext uri="{BB962C8B-B14F-4D97-AF65-F5344CB8AC3E}">
+        <p14:creationId xmlns:p14="http://schemas.microsoft.com/office/powerpoint/2010/main" val="1016894726"/>
+      </p:ext>
+    </p:extLst>
+  </p:cSld>
+  <p:clrMapOvr>
+    <a:masterClrMapping/>
+  </p:clrMapOvr>
+</p:sld>
+</file>
+
+<file path=ppt/slides/slide8.xml><?xml version="1.0" encoding="utf-8"?>
+<p:sld xmlns:a="http://schemas.openxmlformats.org/drawingml/2006/main" xmlns:r="http://schemas.openxmlformats.org/officeDocument/2006/relationships" xmlns:p="http://schemas.openxmlformats.org/presentationml/2006/main">
+  <p:cSld>
+    <p:spTree>
+      <p:nvGrpSpPr>
+        <p:cNvPr id="1" name=""/>
+        <p:cNvGrpSpPr/>
+        <p:nvPr/>
+      </p:nvGrpSpPr>
+      <p:grpSpPr>
+        <a:xfrm>
+          <a:off x="0" y="0"/>
+          <a:ext cx="0" cy="0"/>
+          <a:chOff x="0" y="0"/>
+          <a:chExt cx="0" cy="0"/>
+        </a:xfrm>
+      </p:grpSpPr>
+      <p:pic>
+        <p:nvPicPr>
+          <p:cNvPr id="2" name="Picture 1">
+            <a:extLst>
+              <a:ext uri="{FF2B5EF4-FFF2-40B4-BE49-F238E27FC236}">
+                <a16:creationId xmlns:a16="http://schemas.microsoft.com/office/drawing/2014/main" id="{1D7F9DD6-14B0-4800-B9BB-4B49FFC3844A}"/>
+              </a:ext>
+            </a:extLst>
+          </p:cNvPr>
+          <p:cNvPicPr>
+            <a:picLocks noChangeAspect="1"/>
+          </p:cNvPicPr>
+          <p:nvPr/>
+        </p:nvPicPr>
+        <p:blipFill>
+          <a:blip r:embed="rId2"/>
+          <a:stretch>
+            <a:fillRect/>
+          </a:stretch>
+        </p:blipFill>
+        <p:spPr>
+          <a:xfrm>
+            <a:off x="1908097" y="0"/>
+            <a:ext cx="10287000" cy="6858000"/>
+          </a:xfrm>
+          <a:prstGeom prst="rect">
+            <a:avLst/>
+          </a:prstGeom>
+        </p:spPr>
+      </p:pic>
+      <p:sp>
+        <p:nvSpPr>
+          <p:cNvPr id="8" name="Arrow: Up 7">
+            <a:extLst>
+              <a:ext uri="{FF2B5EF4-FFF2-40B4-BE49-F238E27FC236}">
+                <a16:creationId xmlns:a16="http://schemas.microsoft.com/office/drawing/2014/main" id="{2EF3D950-6F69-4FF9-823E-BDB90FD85C73}"/>
+              </a:ext>
+            </a:extLst>
+          </p:cNvPr>
+          <p:cNvSpPr/>
+          <p:nvPr/>
+        </p:nvSpPr>
+        <p:spPr>
+          <a:xfrm>
+            <a:off x="3674074" y="2648458"/>
+            <a:ext cx="263611" cy="477795"/>
+          </a:xfrm>
+          <a:prstGeom prst="upArrow">
+            <a:avLst/>
+          </a:prstGeom>
+        </p:spPr>
+        <p:style>
+          <a:lnRef idx="2">
+            <a:schemeClr val="accent1">
+              <a:shade val="50000"/>
+            </a:schemeClr>
+          </a:lnRef>
+          <a:fillRef idx="1">
+            <a:schemeClr val="accent1"/>
+          </a:fillRef>
+          <a:effectRef idx="0">
+            <a:schemeClr val="accent1"/>
+          </a:effectRef>
+          <a:fontRef idx="minor">
+            <a:schemeClr val="lt1"/>
+          </a:fontRef>
+        </p:style>
+        <p:txBody>
+          <a:bodyPr rtlCol="0" anchor="ctr"/>
+          <a:lstStyle/>
+          <a:p>
+            <a:pPr algn="ctr"/>
+            <a:endParaRPr lang="en-CH"/>
+          </a:p>
+        </p:txBody>
+      </p:sp>
+      <p:sp>
+        <p:nvSpPr>
+          <p:cNvPr id="9" name="TextBox 8">
+            <a:extLst>
+              <a:ext uri="{FF2B5EF4-FFF2-40B4-BE49-F238E27FC236}">
+                <a16:creationId xmlns:a16="http://schemas.microsoft.com/office/drawing/2014/main" id="{001F6CED-9127-4637-89CB-8C03A244AF70}"/>
+              </a:ext>
+            </a:extLst>
+          </p:cNvPr>
+          <p:cNvSpPr txBox="1"/>
+          <p:nvPr/>
+        </p:nvSpPr>
+        <p:spPr>
+          <a:xfrm>
+            <a:off x="3299239" y="3126253"/>
+            <a:ext cx="3653495" cy="584775"/>
+          </a:xfrm>
+          <a:prstGeom prst="rect">
+            <a:avLst/>
+          </a:prstGeom>
+          <a:noFill/>
+        </p:spPr>
+        <p:txBody>
+          <a:bodyPr wrap="square" rtlCol="0">
+            <a:spAutoFit/>
+          </a:bodyPr>
+          <a:lstStyle/>
+          <a:p>
+            <a:r>
+              <a:rPr lang="de-CH" sz="1600" dirty="0"/>
+              <a:t>Login </a:t>
+            </a:r>
+            <a:r>
+              <a:rPr lang="de-CH" sz="1600" dirty="0" err="1"/>
+              <a:t>with</a:t>
+            </a:r>
+            <a:r>
+              <a:rPr lang="de-CH" sz="1600" dirty="0"/>
+              <a:t> </a:t>
+            </a:r>
+            <a:r>
+              <a:rPr lang="de-CH" sz="1600" dirty="0" err="1"/>
+              <a:t>your</a:t>
+            </a:r>
+            <a:r>
+              <a:rPr lang="de-CH" sz="1600" dirty="0"/>
+              <a:t> </a:t>
+            </a:r>
+            <a:r>
+              <a:rPr lang="de-CH" sz="1600" dirty="0" err="1"/>
+              <a:t>credentials</a:t>
+            </a:r>
+            <a:r>
+              <a:rPr lang="de-CH" sz="1600" dirty="0"/>
+              <a:t> </a:t>
+            </a:r>
+            <a:r>
+              <a:rPr lang="de-CH" sz="1600" dirty="0" err="1"/>
+              <a:t>or</a:t>
+            </a:r>
+            <a:r>
+              <a:rPr lang="de-CH" sz="1600" dirty="0"/>
+              <a:t> </a:t>
+            </a:r>
+            <a:r>
+              <a:rPr lang="de-CH" sz="1600" dirty="0" err="1"/>
+              <a:t>go</a:t>
+            </a:r>
+            <a:r>
+              <a:rPr lang="de-CH" sz="1600" dirty="0"/>
+              <a:t> </a:t>
+            </a:r>
+            <a:r>
+              <a:rPr lang="de-CH" sz="1600" dirty="0" err="1"/>
+              <a:t>to</a:t>
+            </a:r>
+            <a:r>
+              <a:rPr lang="de-CH" sz="1600" dirty="0"/>
+              <a:t> Registration Form</a:t>
+            </a:r>
+            <a:endParaRPr lang="en-CH" sz="1600" dirty="0"/>
+          </a:p>
+        </p:txBody>
+      </p:sp>
+      <p:sp>
+        <p:nvSpPr>
+          <p:cNvPr id="10" name="Arrow: Up 9">
+            <a:extLst>
+              <a:ext uri="{FF2B5EF4-FFF2-40B4-BE49-F238E27FC236}">
+                <a16:creationId xmlns:a16="http://schemas.microsoft.com/office/drawing/2014/main" id="{1763DD43-71E1-4EFC-B099-F52290300238}"/>
+              </a:ext>
+            </a:extLst>
+          </p:cNvPr>
+          <p:cNvSpPr/>
+          <p:nvPr/>
+        </p:nvSpPr>
+        <p:spPr>
+          <a:xfrm>
+            <a:off x="4296036" y="2652575"/>
+            <a:ext cx="263611" cy="477795"/>
+          </a:xfrm>
+          <a:prstGeom prst="upArrow">
+            <a:avLst/>
+          </a:prstGeom>
+        </p:spPr>
+        <p:style>
+          <a:lnRef idx="2">
+            <a:schemeClr val="accent1">
+              <a:shade val="50000"/>
+            </a:schemeClr>
+          </a:lnRef>
+          <a:fillRef idx="1">
+            <a:schemeClr val="accent1"/>
+          </a:fillRef>
+          <a:effectRef idx="0">
+            <a:schemeClr val="accent1"/>
+          </a:effectRef>
+          <a:fontRef idx="minor">
+            <a:schemeClr val="lt1"/>
+          </a:fontRef>
+        </p:style>
+        <p:txBody>
+          <a:bodyPr rtlCol="0" anchor="ctr"/>
+          <a:lstStyle/>
+          <a:p>
+            <a:pPr algn="ctr"/>
+            <a:endParaRPr lang="en-CH"/>
+          </a:p>
+        </p:txBody>
+      </p:sp>
+    </p:spTree>
+    <p:extLst>
+      <p:ext uri="{BB962C8B-B14F-4D97-AF65-F5344CB8AC3E}">
+        <p14:creationId xmlns:p14="http://schemas.microsoft.com/office/powerpoint/2010/main" val="4009469257"/>
+      </p:ext>
+    </p:extLst>
+  </p:cSld>
+  <p:clrMapOvr>
+    <a:masterClrMapping/>
+  </p:clrMapOvr>
+</p:sld>
+</file>
+
+<file path=ppt/slides/slide9.xml><?xml version="1.0" encoding="utf-8"?>
+<p:sld xmlns:a="http://schemas.openxmlformats.org/drawingml/2006/main" xmlns:r="http://schemas.openxmlformats.org/officeDocument/2006/relationships" xmlns:p="http://schemas.openxmlformats.org/presentationml/2006/main">
+  <p:cSld>
+    <p:spTree>
+      <p:nvGrpSpPr>
+        <p:cNvPr id="1" name=""/>
+        <p:cNvGrpSpPr/>
+        <p:nvPr/>
+      </p:nvGrpSpPr>
+      <p:grpSpPr>
+        <a:xfrm>
+          <a:off x="0" y="0"/>
+          <a:ext cx="0" cy="0"/>
+          <a:chOff x="0" y="0"/>
+          <a:chExt cx="0" cy="0"/>
+        </a:xfrm>
+      </p:grpSpPr>
+      <p:pic>
+        <p:nvPicPr>
+          <p:cNvPr id="3" name="Picture 2">
+            <a:extLst>
+              <a:ext uri="{FF2B5EF4-FFF2-40B4-BE49-F238E27FC236}">
+                <a16:creationId xmlns:a16="http://schemas.microsoft.com/office/drawing/2014/main" id="{ACE17FC6-F6E1-44D9-82B1-E049E30BBECB}"/>
+              </a:ext>
+            </a:extLst>
+          </p:cNvPr>
+          <p:cNvPicPr>
+            <a:picLocks noChangeAspect="1"/>
+          </p:cNvPicPr>
+          <p:nvPr/>
+        </p:nvPicPr>
+        <p:blipFill>
+          <a:blip r:embed="rId2"/>
+          <a:stretch>
+            <a:fillRect/>
+          </a:stretch>
+        </p:blipFill>
+        <p:spPr>
+          <a:xfrm>
+            <a:off x="1908094" y="0"/>
+            <a:ext cx="10287000" cy="6858000"/>
+          </a:xfrm>
+          <a:prstGeom prst="rect">
+            <a:avLst/>
+          </a:prstGeom>
+        </p:spPr>
+      </p:pic>
+      <p:sp>
+        <p:nvSpPr>
+          <p:cNvPr id="8" name="Arrow: Up 7">
+            <a:extLst>
+              <a:ext uri="{FF2B5EF4-FFF2-40B4-BE49-F238E27FC236}">
+                <a16:creationId xmlns:a16="http://schemas.microsoft.com/office/drawing/2014/main" id="{2EF3D950-6F69-4FF9-823E-BDB90FD85C73}"/>
+              </a:ext>
+            </a:extLst>
+          </p:cNvPr>
+          <p:cNvSpPr/>
+          <p:nvPr/>
+        </p:nvSpPr>
+        <p:spPr>
+          <a:xfrm>
+            <a:off x="2154171" y="1324229"/>
+            <a:ext cx="263611" cy="477795"/>
+          </a:xfrm>
+          <a:prstGeom prst="upArrow">
+            <a:avLst/>
+          </a:prstGeom>
+        </p:spPr>
+        <p:style>
+          <a:lnRef idx="2">
+            <a:schemeClr val="accent1">
+              <a:shade val="50000"/>
+            </a:schemeClr>
+          </a:lnRef>
+          <a:fillRef idx="1">
+            <a:schemeClr val="accent1"/>
+          </a:fillRef>
+          <a:effectRef idx="0">
+            <a:schemeClr val="accent1"/>
+          </a:effectRef>
+          <a:fontRef idx="minor">
+            <a:schemeClr val="lt1"/>
+          </a:fontRef>
+        </p:style>
+        <p:txBody>
+          <a:bodyPr rtlCol="0" anchor="ctr"/>
+          <a:lstStyle/>
+          <a:p>
+            <a:pPr algn="ctr"/>
+            <a:endParaRPr lang="en-CH"/>
+          </a:p>
+        </p:txBody>
+      </p:sp>
+      <p:sp>
+        <p:nvSpPr>
+          <p:cNvPr id="9" name="TextBox 8">
+            <a:extLst>
+              <a:ext uri="{FF2B5EF4-FFF2-40B4-BE49-F238E27FC236}">
+                <a16:creationId xmlns:a16="http://schemas.microsoft.com/office/drawing/2014/main" id="{001F6CED-9127-4637-89CB-8C03A244AF70}"/>
+              </a:ext>
+            </a:extLst>
+          </p:cNvPr>
+          <p:cNvSpPr txBox="1"/>
+          <p:nvPr/>
+        </p:nvSpPr>
+        <p:spPr>
+          <a:xfrm>
+            <a:off x="1898856" y="1806373"/>
+            <a:ext cx="1388042" cy="830997"/>
+          </a:xfrm>
+          <a:prstGeom prst="rect">
+            <a:avLst/>
+          </a:prstGeom>
+          <a:noFill/>
+        </p:spPr>
+        <p:txBody>
+          <a:bodyPr wrap="square" rtlCol="0">
+            <a:spAutoFit/>
+          </a:bodyPr>
+          <a:lstStyle/>
+          <a:p>
+            <a:r>
+              <a:rPr lang="de-CH" sz="1600" dirty="0"/>
+              <a:t>Redirects </a:t>
+            </a:r>
+            <a:r>
+              <a:rPr lang="de-CH" sz="1600" dirty="0" err="1"/>
+              <a:t>to</a:t>
+            </a:r>
+            <a:r>
+              <a:rPr lang="de-CH" sz="1600" dirty="0"/>
+              <a:t> Create a Job Form</a:t>
+            </a:r>
+            <a:endParaRPr lang="en-CH" sz="1600" dirty="0"/>
+          </a:p>
+        </p:txBody>
+      </p:sp>
+      <p:sp>
+        <p:nvSpPr>
+          <p:cNvPr id="7" name="TextBox 6">
+            <a:extLst>
+              <a:ext uri="{FF2B5EF4-FFF2-40B4-BE49-F238E27FC236}">
+                <a16:creationId xmlns:a16="http://schemas.microsoft.com/office/drawing/2014/main" id="{D707282B-7F69-4459-BBDF-74F648A597E2}"/>
+              </a:ext>
+            </a:extLst>
+          </p:cNvPr>
+          <p:cNvSpPr txBox="1"/>
+          <p:nvPr/>
+        </p:nvSpPr>
+        <p:spPr>
+          <a:xfrm>
+            <a:off x="0" y="1313932"/>
+            <a:ext cx="1898855" cy="1569660"/>
+          </a:xfrm>
+          <a:prstGeom prst="rect">
+            <a:avLst/>
+          </a:prstGeom>
+          <a:noFill/>
+        </p:spPr>
+        <p:txBody>
+          <a:bodyPr wrap="square" rtlCol="0">
+            <a:spAutoFit/>
+          </a:bodyPr>
+          <a:lstStyle/>
+          <a:p>
+            <a:r>
+              <a:rPr lang="de-CH" sz="1600" dirty="0" err="1"/>
+              <a:t>If</a:t>
+            </a:r>
+            <a:r>
+              <a:rPr lang="de-CH" sz="1600" dirty="0"/>
+              <a:t> </a:t>
+            </a:r>
+            <a:r>
+              <a:rPr lang="de-CH" sz="1600" dirty="0" err="1"/>
+              <a:t>logged</a:t>
+            </a:r>
+            <a:r>
+              <a:rPr lang="de-CH" sz="1600" dirty="0"/>
+              <a:t> in </a:t>
+            </a:r>
+            <a:r>
+              <a:rPr lang="de-CH" sz="1600" dirty="0" err="1"/>
+              <a:t>as</a:t>
+            </a:r>
+            <a:r>
+              <a:rPr lang="de-CH" sz="1600" dirty="0"/>
+              <a:t> a </a:t>
+            </a:r>
+            <a:r>
+              <a:rPr lang="de-CH" sz="1600" dirty="0" err="1"/>
+              <a:t>company</a:t>
+            </a:r>
+            <a:r>
+              <a:rPr lang="de-CH" sz="1600" dirty="0"/>
+              <a:t> (and not </a:t>
+            </a:r>
+            <a:r>
+              <a:rPr lang="de-CH" sz="1600" dirty="0" err="1"/>
+              <a:t>the</a:t>
+            </a:r>
+            <a:r>
+              <a:rPr lang="de-CH" sz="1600" dirty="0"/>
+              <a:t> </a:t>
+            </a:r>
+            <a:r>
+              <a:rPr lang="de-CH" sz="1600" dirty="0" err="1"/>
+              <a:t>admin</a:t>
+            </a:r>
+            <a:r>
+              <a:rPr lang="de-CH" sz="1600" dirty="0"/>
+              <a:t>) </a:t>
+            </a:r>
+            <a:r>
+              <a:rPr lang="de-CH" sz="1600" dirty="0" err="1"/>
+              <a:t>you</a:t>
+            </a:r>
+            <a:r>
+              <a:rPr lang="de-CH" sz="1600" dirty="0"/>
+              <a:t> </a:t>
+            </a:r>
+            <a:r>
+              <a:rPr lang="de-CH" sz="1600" dirty="0" err="1"/>
+              <a:t>get</a:t>
+            </a:r>
+            <a:r>
+              <a:rPr lang="de-CH" sz="1600" dirty="0"/>
+              <a:t> </a:t>
+            </a:r>
+            <a:r>
+              <a:rPr lang="de-CH" sz="1600" dirty="0" err="1"/>
+              <a:t>the</a:t>
+            </a:r>
+            <a:r>
+              <a:rPr lang="de-CH" sz="1600" dirty="0"/>
+              <a:t> </a:t>
+            </a:r>
+            <a:r>
+              <a:rPr lang="de-CH" sz="1600" dirty="0" err="1"/>
+              <a:t>following</a:t>
+            </a:r>
+            <a:r>
+              <a:rPr lang="de-CH" sz="1600" dirty="0"/>
+              <a:t> </a:t>
+            </a:r>
+            <a:r>
+              <a:rPr lang="de-CH" sz="1600" dirty="0" err="1"/>
+              <a:t>side</a:t>
+            </a:r>
+            <a:r>
+              <a:rPr lang="de-CH" sz="1600" dirty="0"/>
+              <a:t>-panel and </a:t>
+            </a:r>
+            <a:r>
+              <a:rPr lang="de-CH" sz="1600" dirty="0" err="1"/>
+              <a:t>the</a:t>
+            </a:r>
+            <a:r>
+              <a:rPr lang="de-CH" sz="1600" dirty="0"/>
+              <a:t> </a:t>
+            </a:r>
+            <a:r>
+              <a:rPr lang="de-CH" sz="1600" dirty="0" err="1"/>
+              <a:t>new</a:t>
+            </a:r>
+            <a:r>
+              <a:rPr lang="de-CH" sz="1600" dirty="0"/>
+              <a:t> </a:t>
+            </a:r>
+            <a:r>
+              <a:rPr lang="de-CH" sz="1600" dirty="0" err="1"/>
+              <a:t>navigation</a:t>
+            </a:r>
+            <a:r>
+              <a:rPr lang="de-CH" sz="1600" dirty="0"/>
+              <a:t>-bar </a:t>
+            </a:r>
+            <a:r>
+              <a:rPr lang="de-CH" sz="1600" dirty="0" err="1"/>
+              <a:t>entry</a:t>
+            </a:r>
+            <a:endParaRPr lang="en-CH" sz="1600" dirty="0"/>
+          </a:p>
+        </p:txBody>
+      </p:sp>
+      <p:sp>
+        <p:nvSpPr>
+          <p:cNvPr id="11" name="Arrow: Up 10">
+            <a:extLst>
+              <a:ext uri="{FF2B5EF4-FFF2-40B4-BE49-F238E27FC236}">
+                <a16:creationId xmlns:a16="http://schemas.microsoft.com/office/drawing/2014/main" id="{A09BA340-4DFA-4A06-BF7D-B171EB41BDB3}"/>
+              </a:ext>
+            </a:extLst>
+          </p:cNvPr>
+          <p:cNvSpPr/>
+          <p:nvPr/>
+        </p:nvSpPr>
+        <p:spPr>
+          <a:xfrm rot="16200000">
+            <a:off x="4407216" y="389234"/>
+            <a:ext cx="263611" cy="477795"/>
+          </a:xfrm>
+          <a:prstGeom prst="upArrow">
+            <a:avLst/>
+          </a:prstGeom>
+        </p:spPr>
+        <p:style>
+          <a:lnRef idx="2">
+            <a:schemeClr val="accent1">
+              <a:shade val="50000"/>
+            </a:schemeClr>
+          </a:lnRef>
+          <a:fillRef idx="1">
+            <a:schemeClr val="accent1"/>
+          </a:fillRef>
+          <a:effectRef idx="0">
+            <a:schemeClr val="accent1"/>
+          </a:effectRef>
+          <a:fontRef idx="minor">
+            <a:schemeClr val="lt1"/>
+          </a:fontRef>
+        </p:style>
+        <p:txBody>
+          <a:bodyPr rtlCol="0" anchor="ctr"/>
+          <a:lstStyle/>
+          <a:p>
+            <a:pPr algn="ctr"/>
+            <a:endParaRPr lang="en-CH"/>
+          </a:p>
+        </p:txBody>
+      </p:sp>
+      <p:sp>
+        <p:nvSpPr>
+          <p:cNvPr id="12" name="TextBox 11">
+            <a:extLst>
+              <a:ext uri="{FF2B5EF4-FFF2-40B4-BE49-F238E27FC236}">
+                <a16:creationId xmlns:a16="http://schemas.microsoft.com/office/drawing/2014/main" id="{878FA4E7-500A-4A6D-AE94-B2879F51656C}"/>
+              </a:ext>
+            </a:extLst>
+          </p:cNvPr>
+          <p:cNvSpPr txBox="1"/>
+          <p:nvPr/>
+        </p:nvSpPr>
+        <p:spPr>
+          <a:xfrm>
+            <a:off x="4787156" y="482935"/>
+            <a:ext cx="3162357" cy="338554"/>
+          </a:xfrm>
+          <a:prstGeom prst="rect">
+            <a:avLst/>
+          </a:prstGeom>
+          <a:noFill/>
+        </p:spPr>
+        <p:txBody>
+          <a:bodyPr wrap="square" rtlCol="0">
+            <a:spAutoFit/>
+          </a:bodyPr>
+          <a:lstStyle/>
+          <a:p>
+            <a:r>
+              <a:rPr lang="de-CH" sz="1600" dirty="0">
+                <a:solidFill>
+                  <a:schemeClr val="bg1">
+                    <a:lumMod val="95000"/>
+                  </a:schemeClr>
+                </a:solidFill>
+              </a:rPr>
+              <a:t>Shows all </a:t>
+            </a:r>
+            <a:r>
+              <a:rPr lang="de-CH" sz="1600" dirty="0" err="1">
+                <a:solidFill>
+                  <a:schemeClr val="bg1">
+                    <a:lumMod val="95000"/>
+                  </a:schemeClr>
+                </a:solidFill>
+              </a:rPr>
+              <a:t>jobs</a:t>
+            </a:r>
+            <a:r>
+              <a:rPr lang="de-CH" sz="1600" dirty="0">
+                <a:solidFill>
+                  <a:schemeClr val="bg1">
+                    <a:lumMod val="95000"/>
+                  </a:schemeClr>
+                </a:solidFill>
+              </a:rPr>
+              <a:t> </a:t>
+            </a:r>
+            <a:r>
+              <a:rPr lang="de-CH" sz="1600" dirty="0" err="1">
+                <a:solidFill>
+                  <a:schemeClr val="bg1">
+                    <a:lumMod val="95000"/>
+                  </a:schemeClr>
+                </a:solidFill>
+              </a:rPr>
+              <a:t>that</a:t>
+            </a:r>
+            <a:r>
+              <a:rPr lang="de-CH" sz="1600" dirty="0">
+                <a:solidFill>
+                  <a:schemeClr val="bg1">
+                    <a:lumMod val="95000"/>
+                  </a:schemeClr>
+                </a:solidFill>
+              </a:rPr>
+              <a:t> </a:t>
+            </a:r>
+            <a:r>
+              <a:rPr lang="de-CH" sz="1600" dirty="0" err="1">
+                <a:solidFill>
+                  <a:schemeClr val="bg1">
+                    <a:lumMod val="95000"/>
+                  </a:schemeClr>
+                </a:solidFill>
+              </a:rPr>
+              <a:t>user</a:t>
+            </a:r>
+            <a:r>
+              <a:rPr lang="de-CH" sz="1600" dirty="0">
+                <a:solidFill>
+                  <a:schemeClr val="bg1">
+                    <a:lumMod val="95000"/>
+                  </a:schemeClr>
+                </a:solidFill>
+              </a:rPr>
+              <a:t> </a:t>
+            </a:r>
+            <a:r>
+              <a:rPr lang="de-CH" sz="1600" dirty="0" err="1">
+                <a:solidFill>
+                  <a:schemeClr val="bg1">
+                    <a:lumMod val="95000"/>
+                  </a:schemeClr>
+                </a:solidFill>
+              </a:rPr>
+              <a:t>has</a:t>
+            </a:r>
+            <a:r>
+              <a:rPr lang="de-CH" sz="1600" dirty="0">
+                <a:solidFill>
+                  <a:schemeClr val="bg1">
+                    <a:lumMod val="95000"/>
+                  </a:schemeClr>
+                </a:solidFill>
+              </a:rPr>
+              <a:t> </a:t>
+            </a:r>
+            <a:r>
+              <a:rPr lang="de-CH" sz="1600" dirty="0" err="1">
+                <a:solidFill>
+                  <a:schemeClr val="bg1">
+                    <a:lumMod val="95000"/>
+                  </a:schemeClr>
+                </a:solidFill>
+              </a:rPr>
+              <a:t>created</a:t>
+            </a:r>
+            <a:endParaRPr lang="en-CH" sz="1600" dirty="0">
+              <a:solidFill>
+                <a:schemeClr val="bg1">
+                  <a:lumMod val="95000"/>
+                </a:schemeClr>
+              </a:solidFill>
+            </a:endParaRPr>
+          </a:p>
+        </p:txBody>
+      </p:sp>
+    </p:spTree>
+    <p:extLst>
+      <p:ext uri="{BB962C8B-B14F-4D97-AF65-F5344CB8AC3E}">
+        <p14:creationId xmlns:p14="http://schemas.microsoft.com/office/powerpoint/2010/main" val="3946503538"/>
       </p:ext>
     </p:extLst>
   </p:cSld>

</xml_diff>

<commit_message>
Updated Visual Production Manual
</commit_message>
<xml_diff>
--- a/documentation/Visual Product Manual/Visual Production Manual.pptx
+++ b/documentation/Visual Product Manual/Visual Production Manual.pptx
@@ -17,6 +17,9 @@
     <p:sldId id="265" r:id="rId11"/>
     <p:sldId id="267" r:id="rId12"/>
     <p:sldId id="266" r:id="rId13"/>
+    <p:sldId id="268" r:id="rId14"/>
+    <p:sldId id="269" r:id="rId15"/>
+    <p:sldId id="270" r:id="rId16"/>
   </p:sldIdLst>
   <p:sldSz cx="12192000" cy="6858000"/>
   <p:notesSz cx="6858000" cy="9144000"/>
@@ -4596,7 +4599,7 @@
         <p:spPr>
           <a:xfrm>
             <a:off x="0" y="1313932"/>
-            <a:ext cx="1898855" cy="584775"/>
+            <a:ext cx="1898855" cy="1077218"/>
           </a:xfrm>
           <a:prstGeom prst="rect">
             <a:avLst/>
@@ -4610,26 +4613,224 @@
           <a:lstStyle/>
           <a:p>
             <a:r>
-              <a:rPr lang="de-CH" sz="1600" dirty="0"/>
-              <a:t>Shows </a:t>
-            </a:r>
-            <a:r>
-              <a:rPr lang="de-CH" sz="1600" dirty="0" err="1"/>
-              <a:t>the</a:t>
-            </a:r>
-            <a:r>
-              <a:rPr lang="de-CH" sz="1600" dirty="0"/>
-              <a:t> User and </a:t>
-            </a:r>
-            <a:r>
-              <a:rPr lang="de-CH" sz="1600" dirty="0" err="1"/>
-              <a:t>their</a:t>
-            </a:r>
-            <a:r>
-              <a:rPr lang="de-CH" sz="1600" dirty="0"/>
-              <a:t> Company</a:t>
+              <a:rPr lang="de-CH" sz="1600" dirty="0" err="1"/>
+              <a:t>Unapproved</a:t>
+            </a:r>
+            <a:r>
+              <a:rPr lang="de-CH" sz="1600" dirty="0"/>
+              <a:t> Users </a:t>
+            </a:r>
+            <a:r>
+              <a:rPr lang="de-CH" sz="1600" dirty="0" err="1"/>
+              <a:t>are</a:t>
+            </a:r>
+            <a:r>
+              <a:rPr lang="de-CH" sz="1600" dirty="0"/>
+              <a:t> </a:t>
+            </a:r>
+            <a:r>
+              <a:rPr lang="de-CH" sz="1600" dirty="0" err="1"/>
+              <a:t>denoted</a:t>
+            </a:r>
+            <a:r>
+              <a:rPr lang="de-CH" sz="1600" dirty="0"/>
+              <a:t> and </a:t>
+            </a:r>
+            <a:r>
+              <a:rPr lang="de-CH" sz="1600" dirty="0" err="1"/>
+              <a:t>other</a:t>
+            </a:r>
+            <a:r>
+              <a:rPr lang="de-CH" sz="1600" dirty="0"/>
+              <a:t> notable </a:t>
+            </a:r>
+            <a:r>
+              <a:rPr lang="de-CH" sz="1600" dirty="0" err="1"/>
+              <a:t>information</a:t>
+            </a:r>
+            <a:r>
+              <a:rPr lang="de-CH" sz="1600" dirty="0"/>
+              <a:t> </a:t>
+            </a:r>
+            <a:r>
+              <a:rPr lang="de-CH" sz="1600" dirty="0" err="1"/>
+              <a:t>is</a:t>
+            </a:r>
+            <a:r>
+              <a:rPr lang="de-CH" sz="1600" dirty="0"/>
+              <a:t> </a:t>
+            </a:r>
+            <a:r>
+              <a:rPr lang="de-CH" sz="1600" dirty="0" err="1"/>
+              <a:t>listed</a:t>
             </a:r>
             <a:endParaRPr lang="en-CH" sz="1600" dirty="0"/>
+          </a:p>
+        </p:txBody>
+      </p:sp>
+      <p:pic>
+        <p:nvPicPr>
+          <p:cNvPr id="4" name="Picture 3">
+            <a:extLst>
+              <a:ext uri="{FF2B5EF4-FFF2-40B4-BE49-F238E27FC236}">
+                <a16:creationId xmlns:a16="http://schemas.microsoft.com/office/drawing/2014/main" id="{521C338C-1BD3-469F-B08F-F91159E8151B}"/>
+              </a:ext>
+            </a:extLst>
+          </p:cNvPr>
+          <p:cNvPicPr>
+            <a:picLocks noChangeAspect="1"/>
+          </p:cNvPicPr>
+          <p:nvPr/>
+        </p:nvPicPr>
+        <p:blipFill>
+          <a:blip r:embed="rId2"/>
+          <a:stretch>
+            <a:fillRect/>
+          </a:stretch>
+        </p:blipFill>
+        <p:spPr>
+          <a:xfrm>
+            <a:off x="1898855" y="0"/>
+            <a:ext cx="10287000" cy="6858000"/>
+          </a:xfrm>
+          <a:prstGeom prst="rect">
+            <a:avLst/>
+          </a:prstGeom>
+        </p:spPr>
+      </p:pic>
+      <p:sp>
+        <p:nvSpPr>
+          <p:cNvPr id="6" name="Arrow: Up 5">
+            <a:extLst>
+              <a:ext uri="{FF2B5EF4-FFF2-40B4-BE49-F238E27FC236}">
+                <a16:creationId xmlns:a16="http://schemas.microsoft.com/office/drawing/2014/main" id="{45CF3E37-55C9-46BC-B772-8453BF1C75CC}"/>
+              </a:ext>
+            </a:extLst>
+          </p:cNvPr>
+          <p:cNvSpPr/>
+          <p:nvPr/>
+        </p:nvSpPr>
+        <p:spPr>
+          <a:xfrm rot="16200000">
+            <a:off x="8575532" y="1513700"/>
+            <a:ext cx="263611" cy="477795"/>
+          </a:xfrm>
+          <a:prstGeom prst="upArrow">
+            <a:avLst/>
+          </a:prstGeom>
+        </p:spPr>
+        <p:style>
+          <a:lnRef idx="2">
+            <a:schemeClr val="accent1">
+              <a:shade val="50000"/>
+            </a:schemeClr>
+          </a:lnRef>
+          <a:fillRef idx="1">
+            <a:schemeClr val="accent1"/>
+          </a:fillRef>
+          <a:effectRef idx="0">
+            <a:schemeClr val="accent1"/>
+          </a:effectRef>
+          <a:fontRef idx="minor">
+            <a:schemeClr val="lt1"/>
+          </a:fontRef>
+        </p:style>
+        <p:txBody>
+          <a:bodyPr rtlCol="0" anchor="ctr"/>
+          <a:lstStyle/>
+          <a:p>
+            <a:pPr algn="ctr"/>
+            <a:endParaRPr lang="en-CH"/>
+          </a:p>
+        </p:txBody>
+      </p:sp>
+      <p:sp>
+        <p:nvSpPr>
+          <p:cNvPr id="8" name="TextBox 7">
+            <a:extLst>
+              <a:ext uri="{FF2B5EF4-FFF2-40B4-BE49-F238E27FC236}">
+                <a16:creationId xmlns:a16="http://schemas.microsoft.com/office/drawing/2014/main" id="{8FE5CB66-1C42-4BA6-8055-1C75AA7818BF}"/>
+              </a:ext>
+            </a:extLst>
+          </p:cNvPr>
+          <p:cNvSpPr txBox="1"/>
+          <p:nvPr/>
+        </p:nvSpPr>
+        <p:spPr>
+          <a:xfrm>
+            <a:off x="8905103" y="1765180"/>
+            <a:ext cx="1388042" cy="584775"/>
+          </a:xfrm>
+          <a:prstGeom prst="rect">
+            <a:avLst/>
+          </a:prstGeom>
+          <a:noFill/>
+        </p:spPr>
+        <p:txBody>
+          <a:bodyPr wrap="square" rtlCol="0">
+            <a:spAutoFit/>
+          </a:bodyPr>
+          <a:lstStyle/>
+          <a:p>
+            <a:r>
+              <a:rPr lang="de-CH" sz="1600" dirty="0"/>
+              <a:t>Redirect </a:t>
+            </a:r>
+            <a:r>
+              <a:rPr lang="de-CH" sz="1600" dirty="0" err="1"/>
+              <a:t>to</a:t>
+            </a:r>
+            <a:r>
+              <a:rPr lang="de-CH" sz="1600" dirty="0"/>
+              <a:t> User Edit</a:t>
+            </a:r>
+            <a:endParaRPr lang="en-CH" sz="1600" dirty="0"/>
+          </a:p>
+        </p:txBody>
+      </p:sp>
+      <p:sp>
+        <p:nvSpPr>
+          <p:cNvPr id="9" name="Arrow: Up 8">
+            <a:extLst>
+              <a:ext uri="{FF2B5EF4-FFF2-40B4-BE49-F238E27FC236}">
+                <a16:creationId xmlns:a16="http://schemas.microsoft.com/office/drawing/2014/main" id="{7A8E1741-26BE-4BC6-B4F6-F26DDDD9BB8A}"/>
+              </a:ext>
+            </a:extLst>
+          </p:cNvPr>
+          <p:cNvSpPr/>
+          <p:nvPr/>
+        </p:nvSpPr>
+        <p:spPr>
+          <a:xfrm rot="16200000">
+            <a:off x="8579650" y="2061519"/>
+            <a:ext cx="263611" cy="477795"/>
+          </a:xfrm>
+          <a:prstGeom prst="upArrow">
+            <a:avLst/>
+          </a:prstGeom>
+        </p:spPr>
+        <p:style>
+          <a:lnRef idx="2">
+            <a:schemeClr val="accent1">
+              <a:shade val="50000"/>
+            </a:schemeClr>
+          </a:lnRef>
+          <a:fillRef idx="1">
+            <a:schemeClr val="accent1"/>
+          </a:fillRef>
+          <a:effectRef idx="0">
+            <a:schemeClr val="accent1"/>
+          </a:effectRef>
+          <a:fontRef idx="minor">
+            <a:schemeClr val="lt1"/>
+          </a:fontRef>
+        </p:style>
+        <p:txBody>
+          <a:bodyPr rtlCol="0" anchor="ctr"/>
+          <a:lstStyle/>
+          <a:p>
+            <a:pPr algn="ctr"/>
+            <a:endParaRPr lang="en-CH"/>
           </a:p>
         </p:txBody>
       </p:sp>
@@ -4637,6 +4838,818 @@
     <p:extLst>
       <p:ext uri="{BB962C8B-B14F-4D97-AF65-F5344CB8AC3E}">
         <p14:creationId xmlns:p14="http://schemas.microsoft.com/office/powerpoint/2010/main" val="1593059838"/>
+      </p:ext>
+    </p:extLst>
+  </p:cSld>
+  <p:clrMapOvr>
+    <a:masterClrMapping/>
+  </p:clrMapOvr>
+</p:sld>
+</file>
+
+<file path=ppt/slides/slide13.xml><?xml version="1.0" encoding="utf-8"?>
+<p:sld xmlns:a="http://schemas.openxmlformats.org/drawingml/2006/main" xmlns:r="http://schemas.openxmlformats.org/officeDocument/2006/relationships" xmlns:p="http://schemas.openxmlformats.org/presentationml/2006/main">
+  <p:cSld>
+    <p:spTree>
+      <p:nvGrpSpPr>
+        <p:cNvPr id="1" name=""/>
+        <p:cNvGrpSpPr/>
+        <p:nvPr/>
+      </p:nvGrpSpPr>
+      <p:grpSpPr>
+        <a:xfrm>
+          <a:off x="0" y="0"/>
+          <a:ext cx="0" cy="0"/>
+          <a:chOff x="0" y="0"/>
+          <a:chExt cx="0" cy="0"/>
+        </a:xfrm>
+      </p:grpSpPr>
+      <p:pic>
+        <p:nvPicPr>
+          <p:cNvPr id="2" name="Picture 1">
+            <a:extLst>
+              <a:ext uri="{FF2B5EF4-FFF2-40B4-BE49-F238E27FC236}">
+                <a16:creationId xmlns:a16="http://schemas.microsoft.com/office/drawing/2014/main" id="{28C6D058-DCCD-482A-8175-8E1872C1CEF9}"/>
+              </a:ext>
+            </a:extLst>
+          </p:cNvPr>
+          <p:cNvPicPr>
+            <a:picLocks noChangeAspect="1"/>
+          </p:cNvPicPr>
+          <p:nvPr/>
+        </p:nvPicPr>
+        <p:blipFill>
+          <a:blip r:embed="rId2"/>
+          <a:stretch>
+            <a:fillRect/>
+          </a:stretch>
+        </p:blipFill>
+        <p:spPr>
+          <a:xfrm>
+            <a:off x="1905000" y="0"/>
+            <a:ext cx="10287000" cy="6858000"/>
+          </a:xfrm>
+          <a:prstGeom prst="rect">
+            <a:avLst/>
+          </a:prstGeom>
+        </p:spPr>
+      </p:pic>
+      <p:sp>
+        <p:nvSpPr>
+          <p:cNvPr id="7" name="TextBox 6">
+            <a:extLst>
+              <a:ext uri="{FF2B5EF4-FFF2-40B4-BE49-F238E27FC236}">
+                <a16:creationId xmlns:a16="http://schemas.microsoft.com/office/drawing/2014/main" id="{D707282B-7F69-4459-BBDF-74F648A597E2}"/>
+              </a:ext>
+            </a:extLst>
+          </p:cNvPr>
+          <p:cNvSpPr txBox="1"/>
+          <p:nvPr/>
+        </p:nvSpPr>
+        <p:spPr>
+          <a:xfrm>
+            <a:off x="0" y="1313932"/>
+            <a:ext cx="1898855" cy="1077218"/>
+          </a:xfrm>
+          <a:prstGeom prst="rect">
+            <a:avLst/>
+          </a:prstGeom>
+          <a:noFill/>
+        </p:spPr>
+        <p:txBody>
+          <a:bodyPr wrap="square" rtlCol="0">
+            <a:spAutoFit/>
+          </a:bodyPr>
+          <a:lstStyle/>
+          <a:p>
+            <a:r>
+              <a:rPr lang="de-CH" sz="1600" dirty="0" err="1"/>
+              <a:t>Only</a:t>
+            </a:r>
+            <a:r>
+              <a:rPr lang="de-CH" sz="1600" dirty="0"/>
+              <a:t> </a:t>
+            </a:r>
+            <a:r>
+              <a:rPr lang="de-CH" sz="1600" dirty="0" err="1"/>
+              <a:t>shows</a:t>
+            </a:r>
+            <a:r>
+              <a:rPr lang="de-CH" sz="1600" dirty="0"/>
+              <a:t> </a:t>
+            </a:r>
+            <a:r>
+              <a:rPr lang="de-CH" sz="1600" dirty="0" err="1"/>
+              <a:t>unapproved</a:t>
+            </a:r>
+            <a:r>
+              <a:rPr lang="de-CH" sz="1600" dirty="0"/>
+              <a:t> Users </a:t>
+            </a:r>
+            <a:r>
+              <a:rPr lang="de-CH" sz="1600" dirty="0" err="1"/>
+              <a:t>for</a:t>
+            </a:r>
+            <a:r>
+              <a:rPr lang="de-CH" sz="1600" dirty="0"/>
+              <a:t> </a:t>
+            </a:r>
+            <a:r>
+              <a:rPr lang="de-CH" sz="1600" dirty="0" err="1"/>
+              <a:t>ease</a:t>
+            </a:r>
+            <a:r>
+              <a:rPr lang="de-CH" sz="1600" dirty="0"/>
+              <a:t> </a:t>
+            </a:r>
+            <a:r>
+              <a:rPr lang="de-CH" sz="1600" dirty="0" err="1"/>
+              <a:t>of</a:t>
+            </a:r>
+            <a:r>
+              <a:rPr lang="de-CH" sz="1600" dirty="0"/>
+              <a:t> </a:t>
+            </a:r>
+            <a:r>
+              <a:rPr lang="de-CH" sz="1600" dirty="0" err="1"/>
+              <a:t>approving</a:t>
+            </a:r>
+            <a:endParaRPr lang="en-CH" sz="1600" dirty="0"/>
+          </a:p>
+        </p:txBody>
+      </p:sp>
+    </p:spTree>
+    <p:extLst>
+      <p:ext uri="{BB962C8B-B14F-4D97-AF65-F5344CB8AC3E}">
+        <p14:creationId xmlns:p14="http://schemas.microsoft.com/office/powerpoint/2010/main" val="169950138"/>
+      </p:ext>
+    </p:extLst>
+  </p:cSld>
+  <p:clrMapOvr>
+    <a:masterClrMapping/>
+  </p:clrMapOvr>
+</p:sld>
+</file>
+
+<file path=ppt/slides/slide14.xml><?xml version="1.0" encoding="utf-8"?>
+<p:sld xmlns:a="http://schemas.openxmlformats.org/drawingml/2006/main" xmlns:r="http://schemas.openxmlformats.org/officeDocument/2006/relationships" xmlns:p="http://schemas.openxmlformats.org/presentationml/2006/main">
+  <p:cSld>
+    <p:spTree>
+      <p:nvGrpSpPr>
+        <p:cNvPr id="1" name=""/>
+        <p:cNvGrpSpPr/>
+        <p:nvPr/>
+      </p:nvGrpSpPr>
+      <p:grpSpPr>
+        <a:xfrm>
+          <a:off x="0" y="0"/>
+          <a:ext cx="0" cy="0"/>
+          <a:chOff x="0" y="0"/>
+          <a:chExt cx="0" cy="0"/>
+        </a:xfrm>
+      </p:grpSpPr>
+      <p:sp>
+        <p:nvSpPr>
+          <p:cNvPr id="7" name="TextBox 6">
+            <a:extLst>
+              <a:ext uri="{FF2B5EF4-FFF2-40B4-BE49-F238E27FC236}">
+                <a16:creationId xmlns:a16="http://schemas.microsoft.com/office/drawing/2014/main" id="{D707282B-7F69-4459-BBDF-74F648A597E2}"/>
+              </a:ext>
+            </a:extLst>
+          </p:cNvPr>
+          <p:cNvSpPr txBox="1"/>
+          <p:nvPr/>
+        </p:nvSpPr>
+        <p:spPr>
+          <a:xfrm>
+            <a:off x="0" y="1313932"/>
+            <a:ext cx="1898855" cy="1323439"/>
+          </a:xfrm>
+          <a:prstGeom prst="rect">
+            <a:avLst/>
+          </a:prstGeom>
+          <a:noFill/>
+        </p:spPr>
+        <p:txBody>
+          <a:bodyPr wrap="square" rtlCol="0">
+            <a:spAutoFit/>
+          </a:bodyPr>
+          <a:lstStyle/>
+          <a:p>
+            <a:r>
+              <a:rPr lang="de-CH" sz="1600" dirty="0" err="1"/>
+              <a:t>Editing</a:t>
+            </a:r>
+            <a:r>
+              <a:rPr lang="de-CH" sz="1600" dirty="0"/>
+              <a:t> a User </a:t>
+            </a:r>
+            <a:r>
+              <a:rPr lang="de-CH" sz="1600" dirty="0" err="1"/>
+              <a:t>shows</a:t>
+            </a:r>
+            <a:r>
+              <a:rPr lang="de-CH" sz="1600" dirty="0"/>
+              <a:t> </a:t>
+            </a:r>
+            <a:r>
+              <a:rPr lang="de-CH" sz="1600" dirty="0" err="1"/>
+              <a:t>their</a:t>
+            </a:r>
+            <a:r>
+              <a:rPr lang="de-CH" sz="1600" dirty="0"/>
+              <a:t> </a:t>
+            </a:r>
+            <a:r>
+              <a:rPr lang="de-CH" sz="1600" dirty="0" err="1"/>
+              <a:t>name</a:t>
+            </a:r>
+            <a:r>
+              <a:rPr lang="de-CH" sz="1600" dirty="0"/>
+              <a:t>, and </a:t>
+            </a:r>
+            <a:r>
+              <a:rPr lang="de-CH" sz="1600" dirty="0" err="1"/>
+              <a:t>their</a:t>
+            </a:r>
+            <a:r>
+              <a:rPr lang="de-CH" sz="1600" dirty="0"/>
+              <a:t> </a:t>
+            </a:r>
+            <a:r>
+              <a:rPr lang="de-CH" sz="1600" dirty="0" err="1"/>
+              <a:t>prior</a:t>
+            </a:r>
+            <a:r>
+              <a:rPr lang="de-CH" sz="1600" dirty="0"/>
+              <a:t> </a:t>
+            </a:r>
+            <a:r>
+              <a:rPr lang="de-CH" sz="1600" dirty="0" err="1"/>
+              <a:t>information</a:t>
+            </a:r>
+            <a:r>
+              <a:rPr lang="de-CH" sz="1600" dirty="0"/>
+              <a:t> / </a:t>
+            </a:r>
+            <a:r>
+              <a:rPr lang="de-CH" sz="1600" dirty="0" err="1"/>
+              <a:t>credentials</a:t>
+            </a:r>
+            <a:endParaRPr lang="en-CH" sz="1600" dirty="0"/>
+          </a:p>
+        </p:txBody>
+      </p:sp>
+      <p:pic>
+        <p:nvPicPr>
+          <p:cNvPr id="3" name="Picture 2">
+            <a:extLst>
+              <a:ext uri="{FF2B5EF4-FFF2-40B4-BE49-F238E27FC236}">
+                <a16:creationId xmlns:a16="http://schemas.microsoft.com/office/drawing/2014/main" id="{E5DAC7F3-29D4-4213-B60B-556A41EA36F4}"/>
+              </a:ext>
+            </a:extLst>
+          </p:cNvPr>
+          <p:cNvPicPr>
+            <a:picLocks noChangeAspect="1"/>
+          </p:cNvPicPr>
+          <p:nvPr/>
+        </p:nvPicPr>
+        <p:blipFill>
+          <a:blip r:embed="rId2"/>
+          <a:stretch>
+            <a:fillRect/>
+          </a:stretch>
+        </p:blipFill>
+        <p:spPr>
+          <a:xfrm>
+            <a:off x="1898855" y="0"/>
+            <a:ext cx="10287000" cy="6858000"/>
+          </a:xfrm>
+          <a:prstGeom prst="rect">
+            <a:avLst/>
+          </a:prstGeom>
+        </p:spPr>
+      </p:pic>
+      <p:sp>
+        <p:nvSpPr>
+          <p:cNvPr id="5" name="Arrow: Up 4">
+            <a:extLst>
+              <a:ext uri="{FF2B5EF4-FFF2-40B4-BE49-F238E27FC236}">
+                <a16:creationId xmlns:a16="http://schemas.microsoft.com/office/drawing/2014/main" id="{567F118C-89A7-474F-B266-911F44C7EC24}"/>
+              </a:ext>
+            </a:extLst>
+          </p:cNvPr>
+          <p:cNvSpPr/>
+          <p:nvPr/>
+        </p:nvSpPr>
+        <p:spPr>
+          <a:xfrm rot="17733134">
+            <a:off x="4277454" y="2382907"/>
+            <a:ext cx="263611" cy="477795"/>
+          </a:xfrm>
+          <a:prstGeom prst="upArrow">
+            <a:avLst/>
+          </a:prstGeom>
+        </p:spPr>
+        <p:style>
+          <a:lnRef idx="2">
+            <a:schemeClr val="accent1">
+              <a:shade val="50000"/>
+            </a:schemeClr>
+          </a:lnRef>
+          <a:fillRef idx="1">
+            <a:schemeClr val="accent1"/>
+          </a:fillRef>
+          <a:effectRef idx="0">
+            <a:schemeClr val="accent1"/>
+          </a:effectRef>
+          <a:fontRef idx="minor">
+            <a:schemeClr val="lt1"/>
+          </a:fontRef>
+        </p:style>
+        <p:txBody>
+          <a:bodyPr rtlCol="0" anchor="ctr"/>
+          <a:lstStyle/>
+          <a:p>
+            <a:pPr algn="ctr"/>
+            <a:endParaRPr lang="en-CH"/>
+          </a:p>
+        </p:txBody>
+      </p:sp>
+      <p:sp>
+        <p:nvSpPr>
+          <p:cNvPr id="6" name="TextBox 5">
+            <a:extLst>
+              <a:ext uri="{FF2B5EF4-FFF2-40B4-BE49-F238E27FC236}">
+                <a16:creationId xmlns:a16="http://schemas.microsoft.com/office/drawing/2014/main" id="{4E4CCE6D-1D31-4676-9B5B-80F0CD185A06}"/>
+              </a:ext>
+            </a:extLst>
+          </p:cNvPr>
+          <p:cNvSpPr txBox="1"/>
+          <p:nvPr/>
+        </p:nvSpPr>
+        <p:spPr>
+          <a:xfrm>
+            <a:off x="5336076" y="2077303"/>
+            <a:ext cx="1822626" cy="338554"/>
+          </a:xfrm>
+          <a:prstGeom prst="rect">
+            <a:avLst/>
+          </a:prstGeom>
+          <a:noFill/>
+        </p:spPr>
+        <p:txBody>
+          <a:bodyPr wrap="square" rtlCol="0">
+            <a:spAutoFit/>
+          </a:bodyPr>
+          <a:lstStyle/>
+          <a:p>
+            <a:r>
+              <a:rPr lang="de-CH" sz="1600" dirty="0" err="1"/>
+              <a:t>Reset</a:t>
+            </a:r>
+            <a:r>
+              <a:rPr lang="de-CH" sz="1600" dirty="0"/>
+              <a:t> Data </a:t>
+            </a:r>
+            <a:r>
+              <a:rPr lang="de-CH" sz="1600" dirty="0" err="1"/>
+              <a:t>of</a:t>
+            </a:r>
+            <a:r>
+              <a:rPr lang="de-CH" sz="1600" dirty="0"/>
+              <a:t> User</a:t>
+            </a:r>
+            <a:endParaRPr lang="en-CH" sz="1600" dirty="0"/>
+          </a:p>
+        </p:txBody>
+      </p:sp>
+      <p:sp>
+        <p:nvSpPr>
+          <p:cNvPr id="9" name="Arrow: Up 8">
+            <a:extLst>
+              <a:ext uri="{FF2B5EF4-FFF2-40B4-BE49-F238E27FC236}">
+                <a16:creationId xmlns:a16="http://schemas.microsoft.com/office/drawing/2014/main" id="{072FB0A9-9C03-427C-A886-C0BD94BCEFF3}"/>
+              </a:ext>
+            </a:extLst>
+          </p:cNvPr>
+          <p:cNvSpPr/>
+          <p:nvPr/>
+        </p:nvSpPr>
+        <p:spPr>
+          <a:xfrm rot="16200000">
+            <a:off x="4889144" y="2045154"/>
+            <a:ext cx="263611" cy="477795"/>
+          </a:xfrm>
+          <a:prstGeom prst="upArrow">
+            <a:avLst/>
+          </a:prstGeom>
+        </p:spPr>
+        <p:style>
+          <a:lnRef idx="2">
+            <a:schemeClr val="accent1">
+              <a:shade val="50000"/>
+            </a:schemeClr>
+          </a:lnRef>
+          <a:fillRef idx="1">
+            <a:schemeClr val="accent1"/>
+          </a:fillRef>
+          <a:effectRef idx="0">
+            <a:schemeClr val="accent1"/>
+          </a:effectRef>
+          <a:fontRef idx="minor">
+            <a:schemeClr val="lt1"/>
+          </a:fontRef>
+        </p:style>
+        <p:txBody>
+          <a:bodyPr rtlCol="0" anchor="ctr"/>
+          <a:lstStyle/>
+          <a:p>
+            <a:pPr algn="ctr"/>
+            <a:endParaRPr lang="en-CH"/>
+          </a:p>
+        </p:txBody>
+      </p:sp>
+      <p:sp>
+        <p:nvSpPr>
+          <p:cNvPr id="10" name="TextBox 9">
+            <a:extLst>
+              <a:ext uri="{FF2B5EF4-FFF2-40B4-BE49-F238E27FC236}">
+                <a16:creationId xmlns:a16="http://schemas.microsoft.com/office/drawing/2014/main" id="{514DEA7C-0A0C-4207-BEA0-D92B4C963E52}"/>
+              </a:ext>
+            </a:extLst>
+          </p:cNvPr>
+          <p:cNvSpPr txBox="1"/>
+          <p:nvPr/>
+        </p:nvSpPr>
+        <p:spPr>
+          <a:xfrm>
+            <a:off x="4681643" y="2620655"/>
+            <a:ext cx="2111997" cy="338554"/>
+          </a:xfrm>
+          <a:prstGeom prst="rect">
+            <a:avLst/>
+          </a:prstGeom>
+          <a:noFill/>
+        </p:spPr>
+        <p:txBody>
+          <a:bodyPr wrap="square" rtlCol="0">
+            <a:spAutoFit/>
+          </a:bodyPr>
+          <a:lstStyle/>
+          <a:p>
+            <a:r>
+              <a:rPr lang="de-CH" sz="1600" dirty="0" err="1"/>
+              <a:t>Saves</a:t>
+            </a:r>
+            <a:r>
+              <a:rPr lang="de-CH" sz="1600" dirty="0"/>
+              <a:t> </a:t>
+            </a:r>
+            <a:r>
+              <a:rPr lang="de-CH" sz="1600" dirty="0" err="1"/>
+              <a:t>the</a:t>
+            </a:r>
+            <a:r>
+              <a:rPr lang="de-CH" sz="1600" dirty="0"/>
+              <a:t> Information</a:t>
+            </a:r>
+            <a:endParaRPr lang="en-CH" sz="1600" dirty="0"/>
+          </a:p>
+        </p:txBody>
+      </p:sp>
+      <p:sp>
+        <p:nvSpPr>
+          <p:cNvPr id="11" name="Arrow: Up 10">
+            <a:extLst>
+              <a:ext uri="{FF2B5EF4-FFF2-40B4-BE49-F238E27FC236}">
+                <a16:creationId xmlns:a16="http://schemas.microsoft.com/office/drawing/2014/main" id="{30D599C6-D1A9-4330-80B3-462E923B5CFF}"/>
+              </a:ext>
+            </a:extLst>
+          </p:cNvPr>
+          <p:cNvSpPr/>
+          <p:nvPr/>
+        </p:nvSpPr>
+        <p:spPr>
+          <a:xfrm rot="16200000">
+            <a:off x="9205727" y="2045155"/>
+            <a:ext cx="263611" cy="477795"/>
+          </a:xfrm>
+          <a:prstGeom prst="upArrow">
+            <a:avLst/>
+          </a:prstGeom>
+        </p:spPr>
+        <p:style>
+          <a:lnRef idx="2">
+            <a:schemeClr val="accent1">
+              <a:shade val="50000"/>
+            </a:schemeClr>
+          </a:lnRef>
+          <a:fillRef idx="1">
+            <a:schemeClr val="accent1"/>
+          </a:fillRef>
+          <a:effectRef idx="0">
+            <a:schemeClr val="accent1"/>
+          </a:effectRef>
+          <a:fontRef idx="minor">
+            <a:schemeClr val="lt1"/>
+          </a:fontRef>
+        </p:style>
+        <p:txBody>
+          <a:bodyPr rtlCol="0" anchor="ctr"/>
+          <a:lstStyle/>
+          <a:p>
+            <a:pPr algn="ctr"/>
+            <a:endParaRPr lang="en-CH"/>
+          </a:p>
+        </p:txBody>
+      </p:sp>
+      <p:sp>
+        <p:nvSpPr>
+          <p:cNvPr id="12" name="TextBox 11">
+            <a:extLst>
+              <a:ext uri="{FF2B5EF4-FFF2-40B4-BE49-F238E27FC236}">
+                <a16:creationId xmlns:a16="http://schemas.microsoft.com/office/drawing/2014/main" id="{32B9B758-62FD-4376-8F92-8EC49BD82F81}"/>
+              </a:ext>
+            </a:extLst>
+          </p:cNvPr>
+          <p:cNvSpPr txBox="1"/>
+          <p:nvPr/>
+        </p:nvSpPr>
+        <p:spPr>
+          <a:xfrm>
+            <a:off x="9576430" y="2057738"/>
+            <a:ext cx="1388042" cy="830997"/>
+          </a:xfrm>
+          <a:prstGeom prst="rect">
+            <a:avLst/>
+          </a:prstGeom>
+          <a:noFill/>
+        </p:spPr>
+        <p:txBody>
+          <a:bodyPr wrap="square" rtlCol="0">
+            <a:spAutoFit/>
+          </a:bodyPr>
+          <a:lstStyle/>
+          <a:p>
+            <a:r>
+              <a:rPr lang="de-CH" sz="1600" dirty="0"/>
+              <a:t>Delete User </a:t>
+            </a:r>
+            <a:r>
+              <a:rPr lang="de-CH" sz="1600" dirty="0" err="1"/>
+              <a:t>with</a:t>
+            </a:r>
+            <a:r>
+              <a:rPr lang="de-CH" sz="1600" dirty="0"/>
+              <a:t> </a:t>
+            </a:r>
+            <a:r>
+              <a:rPr lang="de-CH" sz="1600" dirty="0" err="1"/>
+              <a:t>Confirmation</a:t>
+            </a:r>
+            <a:endParaRPr lang="en-CH" sz="1600" dirty="0"/>
+          </a:p>
+        </p:txBody>
+      </p:sp>
+    </p:spTree>
+    <p:extLst>
+      <p:ext uri="{BB962C8B-B14F-4D97-AF65-F5344CB8AC3E}">
+        <p14:creationId xmlns:p14="http://schemas.microsoft.com/office/powerpoint/2010/main" val="825270325"/>
+      </p:ext>
+    </p:extLst>
+  </p:cSld>
+  <p:clrMapOvr>
+    <a:masterClrMapping/>
+  </p:clrMapOvr>
+</p:sld>
+</file>
+
+<file path=ppt/slides/slide15.xml><?xml version="1.0" encoding="utf-8"?>
+<p:sld xmlns:a="http://schemas.openxmlformats.org/drawingml/2006/main" xmlns:r="http://schemas.openxmlformats.org/officeDocument/2006/relationships" xmlns:p="http://schemas.openxmlformats.org/presentationml/2006/main">
+  <p:cSld>
+    <p:spTree>
+      <p:nvGrpSpPr>
+        <p:cNvPr id="1" name=""/>
+        <p:cNvGrpSpPr/>
+        <p:nvPr/>
+      </p:nvGrpSpPr>
+      <p:grpSpPr>
+        <a:xfrm>
+          <a:off x="0" y="0"/>
+          <a:ext cx="0" cy="0"/>
+          <a:chOff x="0" y="0"/>
+          <a:chExt cx="0" cy="0"/>
+        </a:xfrm>
+      </p:grpSpPr>
+      <p:pic>
+        <p:nvPicPr>
+          <p:cNvPr id="2" name="Picture 1">
+            <a:extLst>
+              <a:ext uri="{FF2B5EF4-FFF2-40B4-BE49-F238E27FC236}">
+                <a16:creationId xmlns:a16="http://schemas.microsoft.com/office/drawing/2014/main" id="{482F5C4F-F62D-435A-86D4-15D105097570}"/>
+              </a:ext>
+            </a:extLst>
+          </p:cNvPr>
+          <p:cNvPicPr>
+            <a:picLocks noChangeAspect="1"/>
+          </p:cNvPicPr>
+          <p:nvPr/>
+        </p:nvPicPr>
+        <p:blipFill>
+          <a:blip r:embed="rId2"/>
+          <a:stretch>
+            <a:fillRect/>
+          </a:stretch>
+        </p:blipFill>
+        <p:spPr>
+          <a:xfrm>
+            <a:off x="1905000" y="10408"/>
+            <a:ext cx="10287000" cy="6858000"/>
+          </a:xfrm>
+          <a:prstGeom prst="rect">
+            <a:avLst/>
+          </a:prstGeom>
+        </p:spPr>
+      </p:pic>
+      <p:sp>
+        <p:nvSpPr>
+          <p:cNvPr id="7" name="TextBox 6">
+            <a:extLst>
+              <a:ext uri="{FF2B5EF4-FFF2-40B4-BE49-F238E27FC236}">
+                <a16:creationId xmlns:a16="http://schemas.microsoft.com/office/drawing/2014/main" id="{D707282B-7F69-4459-BBDF-74F648A597E2}"/>
+              </a:ext>
+            </a:extLst>
+          </p:cNvPr>
+          <p:cNvSpPr txBox="1"/>
+          <p:nvPr/>
+        </p:nvSpPr>
+        <p:spPr>
+          <a:xfrm>
+            <a:off x="0" y="1313932"/>
+            <a:ext cx="1898855" cy="1323439"/>
+          </a:xfrm>
+          <a:prstGeom prst="rect">
+            <a:avLst/>
+          </a:prstGeom>
+          <a:noFill/>
+        </p:spPr>
+        <p:txBody>
+          <a:bodyPr wrap="square" rtlCol="0">
+            <a:spAutoFit/>
+          </a:bodyPr>
+          <a:lstStyle/>
+          <a:p>
+            <a:r>
+              <a:rPr lang="de-CH" sz="1600" dirty="0" err="1"/>
+              <a:t>Editing</a:t>
+            </a:r>
+            <a:r>
+              <a:rPr lang="de-CH" sz="1600" dirty="0"/>
+              <a:t> a User </a:t>
+            </a:r>
+            <a:r>
+              <a:rPr lang="de-CH" sz="1600" dirty="0" err="1"/>
+              <a:t>shows</a:t>
+            </a:r>
+            <a:r>
+              <a:rPr lang="de-CH" sz="1600" dirty="0"/>
+              <a:t> </a:t>
+            </a:r>
+            <a:r>
+              <a:rPr lang="de-CH" sz="1600" dirty="0" err="1"/>
+              <a:t>their</a:t>
+            </a:r>
+            <a:r>
+              <a:rPr lang="de-CH" sz="1600" dirty="0"/>
+              <a:t> </a:t>
+            </a:r>
+            <a:r>
+              <a:rPr lang="de-CH" sz="1600" dirty="0" err="1"/>
+              <a:t>name</a:t>
+            </a:r>
+            <a:r>
+              <a:rPr lang="de-CH" sz="1600" dirty="0"/>
+              <a:t>, and </a:t>
+            </a:r>
+            <a:r>
+              <a:rPr lang="de-CH" sz="1600" dirty="0" err="1"/>
+              <a:t>their</a:t>
+            </a:r>
+            <a:r>
+              <a:rPr lang="de-CH" sz="1600" dirty="0"/>
+              <a:t> </a:t>
+            </a:r>
+            <a:r>
+              <a:rPr lang="de-CH" sz="1600" dirty="0" err="1"/>
+              <a:t>prior</a:t>
+            </a:r>
+            <a:r>
+              <a:rPr lang="de-CH" sz="1600" dirty="0"/>
+              <a:t> </a:t>
+            </a:r>
+            <a:r>
+              <a:rPr lang="de-CH" sz="1600" dirty="0" err="1"/>
+              <a:t>information</a:t>
+            </a:r>
+            <a:r>
+              <a:rPr lang="de-CH" sz="1600" dirty="0"/>
+              <a:t> / </a:t>
+            </a:r>
+            <a:r>
+              <a:rPr lang="de-CH" sz="1600" dirty="0" err="1"/>
+              <a:t>credentials</a:t>
+            </a:r>
+            <a:endParaRPr lang="en-CH" sz="1600" dirty="0"/>
+          </a:p>
+        </p:txBody>
+      </p:sp>
+      <p:sp>
+        <p:nvSpPr>
+          <p:cNvPr id="11" name="Arrow: Up 10">
+            <a:extLst>
+              <a:ext uri="{FF2B5EF4-FFF2-40B4-BE49-F238E27FC236}">
+                <a16:creationId xmlns:a16="http://schemas.microsoft.com/office/drawing/2014/main" id="{30D599C6-D1A9-4330-80B3-462E923B5CFF}"/>
+              </a:ext>
+            </a:extLst>
+          </p:cNvPr>
+          <p:cNvSpPr/>
+          <p:nvPr/>
+        </p:nvSpPr>
+        <p:spPr>
+          <a:xfrm rot="16200000">
+            <a:off x="9205727" y="1818840"/>
+            <a:ext cx="263611" cy="477795"/>
+          </a:xfrm>
+          <a:prstGeom prst="upArrow">
+            <a:avLst/>
+          </a:prstGeom>
+        </p:spPr>
+        <p:style>
+          <a:lnRef idx="2">
+            <a:schemeClr val="accent1">
+              <a:shade val="50000"/>
+            </a:schemeClr>
+          </a:lnRef>
+          <a:fillRef idx="1">
+            <a:schemeClr val="accent1"/>
+          </a:fillRef>
+          <a:effectRef idx="0">
+            <a:schemeClr val="accent1"/>
+          </a:effectRef>
+          <a:fontRef idx="minor">
+            <a:schemeClr val="lt1"/>
+          </a:fontRef>
+        </p:style>
+        <p:txBody>
+          <a:bodyPr rtlCol="0" anchor="ctr"/>
+          <a:lstStyle/>
+          <a:p>
+            <a:pPr algn="ctr"/>
+            <a:endParaRPr lang="en-CH"/>
+          </a:p>
+        </p:txBody>
+      </p:sp>
+      <p:sp>
+        <p:nvSpPr>
+          <p:cNvPr id="12" name="TextBox 11">
+            <a:extLst>
+              <a:ext uri="{FF2B5EF4-FFF2-40B4-BE49-F238E27FC236}">
+                <a16:creationId xmlns:a16="http://schemas.microsoft.com/office/drawing/2014/main" id="{32B9B758-62FD-4376-8F92-8EC49BD82F81}"/>
+              </a:ext>
+            </a:extLst>
+          </p:cNvPr>
+          <p:cNvSpPr txBox="1"/>
+          <p:nvPr/>
+        </p:nvSpPr>
+        <p:spPr>
+          <a:xfrm>
+            <a:off x="9576429" y="1867751"/>
+            <a:ext cx="2047159" cy="338554"/>
+          </a:xfrm>
+          <a:prstGeom prst="rect">
+            <a:avLst/>
+          </a:prstGeom>
+          <a:noFill/>
+        </p:spPr>
+        <p:txBody>
+          <a:bodyPr wrap="square" rtlCol="0">
+            <a:spAutoFit/>
+          </a:bodyPr>
+          <a:lstStyle/>
+          <a:p>
+            <a:r>
+              <a:rPr lang="de-CH" sz="1600" dirty="0"/>
+              <a:t>Shows Job Details</a:t>
+            </a:r>
+            <a:endParaRPr lang="en-CH" sz="1600" dirty="0"/>
+          </a:p>
+        </p:txBody>
+      </p:sp>
+    </p:spTree>
+    <p:extLst>
+      <p:ext uri="{BB962C8B-B14F-4D97-AF65-F5344CB8AC3E}">
+        <p14:creationId xmlns:p14="http://schemas.microsoft.com/office/powerpoint/2010/main" val="485869927"/>
       </p:ext>
     </p:extLst>
   </p:cSld>

</xml_diff>